<commit_message>
Last Update 04-10-2018 16:53:21.73
</commit_message>
<xml_diff>
--- a/Lab/Ex 3 Exponentiation of a number/GE8151-E3-Flowchart.pptx
+++ b/Lab/Ex 3 Exponentiation of a number/GE8151-E3-Flowchart.pptx
@@ -4,11 +4,15 @@
   <p:sldMasterIdLst>
     <p:sldMasterId id="2147483648" r:id="rId1"/>
   </p:sldMasterIdLst>
+  <p:notesMasterIdLst>
+    <p:notesMasterId r:id="rId7"/>
+  </p:notesMasterIdLst>
   <p:sldIdLst>
     <p:sldId id="277" r:id="rId2"/>
     <p:sldId id="276" r:id="rId3"/>
     <p:sldId id="280" r:id="rId4"/>
-    <p:sldId id="279" r:id="rId5"/>
+    <p:sldId id="281" r:id="rId5"/>
+    <p:sldId id="279" r:id="rId6"/>
   </p:sldIdLst>
   <p:sldSz cx="6858000" cy="9906000" type="A4"/>
   <p:notesSz cx="6858000" cy="9144000"/>
@@ -108,6 +112,437 @@
     </a:lvl9pPr>
   </p:defaultTextStyle>
 </p:presentation>
+</file>
+
+<file path=ppt/notesMasters/notesMaster1.xml><?xml version="1.0" encoding="utf-8"?>
+<p:notesMaster xmlns:a="http://schemas.openxmlformats.org/drawingml/2006/main" xmlns:r="http://schemas.openxmlformats.org/officeDocument/2006/relationships" xmlns:p="http://schemas.openxmlformats.org/presentationml/2006/main">
+  <p:cSld>
+    <p:bg>
+      <p:bgRef idx="1001">
+        <a:schemeClr val="bg1"/>
+      </p:bgRef>
+    </p:bg>
+    <p:spTree>
+      <p:nvGrpSpPr>
+        <p:cNvPr id="1" name=""/>
+        <p:cNvGrpSpPr/>
+        <p:nvPr/>
+      </p:nvGrpSpPr>
+      <p:grpSpPr>
+        <a:xfrm>
+          <a:off x="0" y="0"/>
+          <a:ext cx="0" cy="0"/>
+          <a:chOff x="0" y="0"/>
+          <a:chExt cx="0" cy="0"/>
+        </a:xfrm>
+      </p:grpSpPr>
+      <p:sp>
+        <p:nvSpPr>
+          <p:cNvPr id="2" name="Header Placeholder 1"/>
+          <p:cNvSpPr>
+            <a:spLocks noGrp="1"/>
+          </p:cNvSpPr>
+          <p:nvPr>
+            <p:ph type="hdr" sz="quarter"/>
+          </p:nvPr>
+        </p:nvSpPr>
+        <p:spPr>
+          <a:xfrm>
+            <a:off x="0" y="0"/>
+            <a:ext cx="2971800" cy="457200"/>
+          </a:xfrm>
+          <a:prstGeom prst="rect">
+            <a:avLst/>
+          </a:prstGeom>
+        </p:spPr>
+        <p:txBody>
+          <a:bodyPr vert="horz" lIns="91440" tIns="45720" rIns="91440" bIns="45720" rtlCol="0"/>
+          <a:lstStyle>
+            <a:lvl1pPr algn="l">
+              <a:defRPr sz="1200"/>
+            </a:lvl1pPr>
+          </a:lstStyle>
+          <a:p>
+            <a:endParaRPr lang="en-US"/>
+          </a:p>
+        </p:txBody>
+      </p:sp>
+      <p:sp>
+        <p:nvSpPr>
+          <p:cNvPr id="3" name="Date Placeholder 2"/>
+          <p:cNvSpPr>
+            <a:spLocks noGrp="1"/>
+          </p:cNvSpPr>
+          <p:nvPr>
+            <p:ph type="dt" idx="1"/>
+          </p:nvPr>
+        </p:nvSpPr>
+        <p:spPr>
+          <a:xfrm>
+            <a:off x="3884613" y="0"/>
+            <a:ext cx="2971800" cy="457200"/>
+          </a:xfrm>
+          <a:prstGeom prst="rect">
+            <a:avLst/>
+          </a:prstGeom>
+        </p:spPr>
+        <p:txBody>
+          <a:bodyPr vert="horz" lIns="91440" tIns="45720" rIns="91440" bIns="45720" rtlCol="0"/>
+          <a:lstStyle>
+            <a:lvl1pPr algn="r">
+              <a:defRPr sz="1200"/>
+            </a:lvl1pPr>
+          </a:lstStyle>
+          <a:p>
+            <a:fld id="{5DF6688B-E7FC-4296-98AB-DDD1B8D062EB}" type="datetimeFigureOut">
+              <a:rPr lang="en-US" smtClean="0"/>
+              <a:pPr/>
+              <a:t>10/4/2018</a:t>
+            </a:fld>
+            <a:endParaRPr lang="en-US"/>
+          </a:p>
+        </p:txBody>
+      </p:sp>
+      <p:sp>
+        <p:nvSpPr>
+          <p:cNvPr id="4" name="Slide Image Placeholder 3"/>
+          <p:cNvSpPr>
+            <a:spLocks noGrp="1" noRot="1" noChangeAspect="1"/>
+          </p:cNvSpPr>
+          <p:nvPr>
+            <p:ph type="sldImg" idx="2"/>
+          </p:nvPr>
+        </p:nvSpPr>
+        <p:spPr>
+          <a:xfrm>
+            <a:off x="2241550" y="685800"/>
+            <a:ext cx="2374900" cy="3429000"/>
+          </a:xfrm>
+          <a:prstGeom prst="rect">
+            <a:avLst/>
+          </a:prstGeom>
+          <a:noFill/>
+          <a:ln w="12700">
+            <a:solidFill>
+              <a:prstClr val="black"/>
+            </a:solidFill>
+          </a:ln>
+        </p:spPr>
+        <p:txBody>
+          <a:bodyPr vert="horz" lIns="91440" tIns="45720" rIns="91440" bIns="45720" rtlCol="0" anchor="ctr"/>
+          <a:lstStyle/>
+          <a:p>
+            <a:endParaRPr lang="en-US"/>
+          </a:p>
+        </p:txBody>
+      </p:sp>
+      <p:sp>
+        <p:nvSpPr>
+          <p:cNvPr id="5" name="Notes Placeholder 4"/>
+          <p:cNvSpPr>
+            <a:spLocks noGrp="1"/>
+          </p:cNvSpPr>
+          <p:nvPr>
+            <p:ph type="body" sz="quarter" idx="3"/>
+          </p:nvPr>
+        </p:nvSpPr>
+        <p:spPr>
+          <a:xfrm>
+            <a:off x="685800" y="4343400"/>
+            <a:ext cx="5486400" cy="4114800"/>
+          </a:xfrm>
+          <a:prstGeom prst="rect">
+            <a:avLst/>
+          </a:prstGeom>
+        </p:spPr>
+        <p:txBody>
+          <a:bodyPr vert="horz" lIns="91440" tIns="45720" rIns="91440" bIns="45720" rtlCol="0">
+            <a:normAutofit/>
+          </a:bodyPr>
+          <a:lstStyle/>
+          <a:p>
+            <a:pPr lvl="0"/>
+            <a:r>
+              <a:rPr lang="en-US" smtClean="0"/>
+              <a:t>Click to edit Master text styles</a:t>
+            </a:r>
+          </a:p>
+          <a:p>
+            <a:pPr lvl="1"/>
+            <a:r>
+              <a:rPr lang="en-US" smtClean="0"/>
+              <a:t>Second level</a:t>
+            </a:r>
+          </a:p>
+          <a:p>
+            <a:pPr lvl="2"/>
+            <a:r>
+              <a:rPr lang="en-US" smtClean="0"/>
+              <a:t>Third level</a:t>
+            </a:r>
+          </a:p>
+          <a:p>
+            <a:pPr lvl="3"/>
+            <a:r>
+              <a:rPr lang="en-US" smtClean="0"/>
+              <a:t>Fourth level</a:t>
+            </a:r>
+          </a:p>
+          <a:p>
+            <a:pPr lvl="4"/>
+            <a:r>
+              <a:rPr lang="en-US" smtClean="0"/>
+              <a:t>Fifth level</a:t>
+            </a:r>
+            <a:endParaRPr lang="en-US"/>
+          </a:p>
+        </p:txBody>
+      </p:sp>
+      <p:sp>
+        <p:nvSpPr>
+          <p:cNvPr id="6" name="Footer Placeholder 5"/>
+          <p:cNvSpPr>
+            <a:spLocks noGrp="1"/>
+          </p:cNvSpPr>
+          <p:nvPr>
+            <p:ph type="ftr" sz="quarter" idx="4"/>
+          </p:nvPr>
+        </p:nvSpPr>
+        <p:spPr>
+          <a:xfrm>
+            <a:off x="0" y="8685213"/>
+            <a:ext cx="2971800" cy="457200"/>
+          </a:xfrm>
+          <a:prstGeom prst="rect">
+            <a:avLst/>
+          </a:prstGeom>
+        </p:spPr>
+        <p:txBody>
+          <a:bodyPr vert="horz" lIns="91440" tIns="45720" rIns="91440" bIns="45720" rtlCol="0" anchor="b"/>
+          <a:lstStyle>
+            <a:lvl1pPr algn="l">
+              <a:defRPr sz="1200"/>
+            </a:lvl1pPr>
+          </a:lstStyle>
+          <a:p>
+            <a:endParaRPr lang="en-US"/>
+          </a:p>
+        </p:txBody>
+      </p:sp>
+      <p:sp>
+        <p:nvSpPr>
+          <p:cNvPr id="7" name="Slide Number Placeholder 6"/>
+          <p:cNvSpPr>
+            <a:spLocks noGrp="1"/>
+          </p:cNvSpPr>
+          <p:nvPr>
+            <p:ph type="sldNum" sz="quarter" idx="5"/>
+          </p:nvPr>
+        </p:nvSpPr>
+        <p:spPr>
+          <a:xfrm>
+            <a:off x="3884613" y="8685213"/>
+            <a:ext cx="2971800" cy="457200"/>
+          </a:xfrm>
+          <a:prstGeom prst="rect">
+            <a:avLst/>
+          </a:prstGeom>
+        </p:spPr>
+        <p:txBody>
+          <a:bodyPr vert="horz" lIns="91440" tIns="45720" rIns="91440" bIns="45720" rtlCol="0" anchor="b"/>
+          <a:lstStyle>
+            <a:lvl1pPr algn="r">
+              <a:defRPr sz="1200"/>
+            </a:lvl1pPr>
+          </a:lstStyle>
+          <a:p>
+            <a:fld id="{992A6DBA-123F-41B1-BB6A-7CB83357C6F8}" type="slidenum">
+              <a:rPr lang="en-US" smtClean="0"/>
+              <a:pPr/>
+              <a:t>‹#›</a:t>
+            </a:fld>
+            <a:endParaRPr lang="en-US"/>
+          </a:p>
+        </p:txBody>
+      </p:sp>
+    </p:spTree>
+  </p:cSld>
+  <p:clrMap bg1="lt1" tx1="dk1" bg2="lt2" tx2="dk2" accent1="accent1" accent2="accent2" accent3="accent3" accent4="accent4" accent5="accent5" accent6="accent6" hlink="hlink" folHlink="folHlink"/>
+  <p:notesStyle>
+    <a:lvl1pPr marL="0" algn="l" defTabSz="914400" rtl="0" eaLnBrk="1" latinLnBrk="0" hangingPunct="1">
+      <a:defRPr sz="1200" kern="1200">
+        <a:solidFill>
+          <a:schemeClr val="tx1"/>
+        </a:solidFill>
+        <a:latin typeface="+mn-lt"/>
+        <a:ea typeface="+mn-ea"/>
+        <a:cs typeface="+mn-cs"/>
+      </a:defRPr>
+    </a:lvl1pPr>
+    <a:lvl2pPr marL="457200" algn="l" defTabSz="914400" rtl="0" eaLnBrk="1" latinLnBrk="0" hangingPunct="1">
+      <a:defRPr sz="1200" kern="1200">
+        <a:solidFill>
+          <a:schemeClr val="tx1"/>
+        </a:solidFill>
+        <a:latin typeface="+mn-lt"/>
+        <a:ea typeface="+mn-ea"/>
+        <a:cs typeface="+mn-cs"/>
+      </a:defRPr>
+    </a:lvl2pPr>
+    <a:lvl3pPr marL="914400" algn="l" defTabSz="914400" rtl="0" eaLnBrk="1" latinLnBrk="0" hangingPunct="1">
+      <a:defRPr sz="1200" kern="1200">
+        <a:solidFill>
+          <a:schemeClr val="tx1"/>
+        </a:solidFill>
+        <a:latin typeface="+mn-lt"/>
+        <a:ea typeface="+mn-ea"/>
+        <a:cs typeface="+mn-cs"/>
+      </a:defRPr>
+    </a:lvl3pPr>
+    <a:lvl4pPr marL="1371600" algn="l" defTabSz="914400" rtl="0" eaLnBrk="1" latinLnBrk="0" hangingPunct="1">
+      <a:defRPr sz="1200" kern="1200">
+        <a:solidFill>
+          <a:schemeClr val="tx1"/>
+        </a:solidFill>
+        <a:latin typeface="+mn-lt"/>
+        <a:ea typeface="+mn-ea"/>
+        <a:cs typeface="+mn-cs"/>
+      </a:defRPr>
+    </a:lvl4pPr>
+    <a:lvl5pPr marL="1828800" algn="l" defTabSz="914400" rtl="0" eaLnBrk="1" latinLnBrk="0" hangingPunct="1">
+      <a:defRPr sz="1200" kern="1200">
+        <a:solidFill>
+          <a:schemeClr val="tx1"/>
+        </a:solidFill>
+        <a:latin typeface="+mn-lt"/>
+        <a:ea typeface="+mn-ea"/>
+        <a:cs typeface="+mn-cs"/>
+      </a:defRPr>
+    </a:lvl5pPr>
+    <a:lvl6pPr marL="2286000" algn="l" defTabSz="914400" rtl="0" eaLnBrk="1" latinLnBrk="0" hangingPunct="1">
+      <a:defRPr sz="1200" kern="1200">
+        <a:solidFill>
+          <a:schemeClr val="tx1"/>
+        </a:solidFill>
+        <a:latin typeface="+mn-lt"/>
+        <a:ea typeface="+mn-ea"/>
+        <a:cs typeface="+mn-cs"/>
+      </a:defRPr>
+    </a:lvl6pPr>
+    <a:lvl7pPr marL="2743200" algn="l" defTabSz="914400" rtl="0" eaLnBrk="1" latinLnBrk="0" hangingPunct="1">
+      <a:defRPr sz="1200" kern="1200">
+        <a:solidFill>
+          <a:schemeClr val="tx1"/>
+        </a:solidFill>
+        <a:latin typeface="+mn-lt"/>
+        <a:ea typeface="+mn-ea"/>
+        <a:cs typeface="+mn-cs"/>
+      </a:defRPr>
+    </a:lvl7pPr>
+    <a:lvl8pPr marL="3200400" algn="l" defTabSz="914400" rtl="0" eaLnBrk="1" latinLnBrk="0" hangingPunct="1">
+      <a:defRPr sz="1200" kern="1200">
+        <a:solidFill>
+          <a:schemeClr val="tx1"/>
+        </a:solidFill>
+        <a:latin typeface="+mn-lt"/>
+        <a:ea typeface="+mn-ea"/>
+        <a:cs typeface="+mn-cs"/>
+      </a:defRPr>
+    </a:lvl8pPr>
+    <a:lvl9pPr marL="3657600" algn="l" defTabSz="914400" rtl="0" eaLnBrk="1" latinLnBrk="0" hangingPunct="1">
+      <a:defRPr sz="1200" kern="1200">
+        <a:solidFill>
+          <a:schemeClr val="tx1"/>
+        </a:solidFill>
+        <a:latin typeface="+mn-lt"/>
+        <a:ea typeface="+mn-ea"/>
+        <a:cs typeface="+mn-cs"/>
+      </a:defRPr>
+    </a:lvl9pPr>
+  </p:notesStyle>
+</p:notesMaster>
+</file>
+
+<file path=ppt/notesSlides/notesSlide1.xml><?xml version="1.0" encoding="utf-8"?>
+<p:notes xmlns:a="http://schemas.openxmlformats.org/drawingml/2006/main" xmlns:r="http://schemas.openxmlformats.org/officeDocument/2006/relationships" xmlns:p="http://schemas.openxmlformats.org/presentationml/2006/main">
+  <p:cSld>
+    <p:spTree>
+      <p:nvGrpSpPr>
+        <p:cNvPr id="1" name=""/>
+        <p:cNvGrpSpPr/>
+        <p:nvPr/>
+      </p:nvGrpSpPr>
+      <p:grpSpPr>
+        <a:xfrm>
+          <a:off x="0" y="0"/>
+          <a:ext cx="0" cy="0"/>
+          <a:chOff x="0" y="0"/>
+          <a:chExt cx="0" cy="0"/>
+        </a:xfrm>
+      </p:grpSpPr>
+      <p:sp>
+        <p:nvSpPr>
+          <p:cNvPr id="2" name="Slide Image Placeholder 1"/>
+          <p:cNvSpPr>
+            <a:spLocks noGrp="1" noRot="1" noChangeAspect="1"/>
+          </p:cNvSpPr>
+          <p:nvPr>
+            <p:ph type="sldImg"/>
+          </p:nvPr>
+        </p:nvSpPr>
+        <p:spPr/>
+      </p:sp>
+      <p:sp>
+        <p:nvSpPr>
+          <p:cNvPr id="3" name="Notes Placeholder 2"/>
+          <p:cNvSpPr>
+            <a:spLocks noGrp="1"/>
+          </p:cNvSpPr>
+          <p:nvPr>
+            <p:ph type="body" idx="1"/>
+          </p:nvPr>
+        </p:nvSpPr>
+        <p:spPr/>
+        <p:txBody>
+          <a:bodyPr>
+            <a:normAutofit/>
+          </a:bodyPr>
+          <a:lstStyle/>
+          <a:p>
+            <a:endParaRPr lang="en-US" dirty="0"/>
+          </a:p>
+        </p:txBody>
+      </p:sp>
+      <p:sp>
+        <p:nvSpPr>
+          <p:cNvPr id="4" name="Slide Number Placeholder 3"/>
+          <p:cNvSpPr>
+            <a:spLocks noGrp="1"/>
+          </p:cNvSpPr>
+          <p:nvPr>
+            <p:ph type="sldNum" sz="quarter" idx="10"/>
+          </p:nvPr>
+        </p:nvSpPr>
+        <p:spPr/>
+        <p:txBody>
+          <a:bodyPr/>
+          <a:lstStyle/>
+          <a:p>
+            <a:fld id="{992A6DBA-123F-41B1-BB6A-7CB83357C6F8}" type="slidenum">
+              <a:rPr lang="en-US" smtClean="0"/>
+              <a:pPr/>
+              <a:t>4</a:t>
+            </a:fld>
+            <a:endParaRPr lang="en-US"/>
+          </a:p>
+        </p:txBody>
+      </p:sp>
+    </p:spTree>
+  </p:cSld>
+  <p:clrMapOvr>
+    <a:masterClrMapping/>
+  </p:clrMapOvr>
+</p:notes>
 </file>
 
 <file path=ppt/slideLayouts/slideLayout1.xml><?xml version="1.0" encoding="utf-8"?>
@@ -292,7 +727,7 @@
             <a:fld id="{A9953F39-409C-4934-84CB-8EF94422C604}" type="datetimeFigureOut">
               <a:rPr lang="en-US" smtClean="0"/>
               <a:pPr/>
-              <a:t>9/28/2018</a:t>
+              <a:t>10/4/2018</a:t>
             </a:fld>
             <a:endParaRPr lang="en-US"/>
           </a:p>
@@ -459,7 +894,7 @@
             <a:fld id="{A9953F39-409C-4934-84CB-8EF94422C604}" type="datetimeFigureOut">
               <a:rPr lang="en-US" smtClean="0"/>
               <a:pPr/>
-              <a:t>9/28/2018</a:t>
+              <a:t>10/4/2018</a:t>
             </a:fld>
             <a:endParaRPr lang="en-US"/>
           </a:p>
@@ -636,7 +1071,7 @@
             <a:fld id="{A9953F39-409C-4934-84CB-8EF94422C604}" type="datetimeFigureOut">
               <a:rPr lang="en-US" smtClean="0"/>
               <a:pPr/>
-              <a:t>9/28/2018</a:t>
+              <a:t>10/4/2018</a:t>
             </a:fld>
             <a:endParaRPr lang="en-US"/>
           </a:p>
@@ -803,7 +1238,7 @@
             <a:fld id="{A9953F39-409C-4934-84CB-8EF94422C604}" type="datetimeFigureOut">
               <a:rPr lang="en-US" smtClean="0"/>
               <a:pPr/>
-              <a:t>9/28/2018</a:t>
+              <a:t>10/4/2018</a:t>
             </a:fld>
             <a:endParaRPr lang="en-US"/>
           </a:p>
@@ -1046,7 +1481,7 @@
             <a:fld id="{A9953F39-409C-4934-84CB-8EF94422C604}" type="datetimeFigureOut">
               <a:rPr lang="en-US" smtClean="0"/>
               <a:pPr/>
-              <a:t>9/28/2018</a:t>
+              <a:t>10/4/2018</a:t>
             </a:fld>
             <a:endParaRPr lang="en-US"/>
           </a:p>
@@ -1331,7 +1766,7 @@
             <a:fld id="{A9953F39-409C-4934-84CB-8EF94422C604}" type="datetimeFigureOut">
               <a:rPr lang="en-US" smtClean="0"/>
               <a:pPr/>
-              <a:t>9/28/2018</a:t>
+              <a:t>10/4/2018</a:t>
             </a:fld>
             <a:endParaRPr lang="en-US"/>
           </a:p>
@@ -1750,7 +2185,7 @@
             <a:fld id="{A9953F39-409C-4934-84CB-8EF94422C604}" type="datetimeFigureOut">
               <a:rPr lang="en-US" smtClean="0"/>
               <a:pPr/>
-              <a:t>9/28/2018</a:t>
+              <a:t>10/4/2018</a:t>
             </a:fld>
             <a:endParaRPr lang="en-US"/>
           </a:p>
@@ -1865,7 +2300,7 @@
             <a:fld id="{A9953F39-409C-4934-84CB-8EF94422C604}" type="datetimeFigureOut">
               <a:rPr lang="en-US" smtClean="0"/>
               <a:pPr/>
-              <a:t>9/28/2018</a:t>
+              <a:t>10/4/2018</a:t>
             </a:fld>
             <a:endParaRPr lang="en-US"/>
           </a:p>
@@ -1957,7 +2392,7 @@
             <a:fld id="{A9953F39-409C-4934-84CB-8EF94422C604}" type="datetimeFigureOut">
               <a:rPr lang="en-US" smtClean="0"/>
               <a:pPr/>
-              <a:t>9/28/2018</a:t>
+              <a:t>10/4/2018</a:t>
             </a:fld>
             <a:endParaRPr lang="en-US"/>
           </a:p>
@@ -2231,7 +2666,7 @@
             <a:fld id="{A9953F39-409C-4934-84CB-8EF94422C604}" type="datetimeFigureOut">
               <a:rPr lang="en-US" smtClean="0"/>
               <a:pPr/>
-              <a:t>9/28/2018</a:t>
+              <a:t>10/4/2018</a:t>
             </a:fld>
             <a:endParaRPr lang="en-US"/>
           </a:p>
@@ -2481,7 +2916,7 @@
             <a:fld id="{A9953F39-409C-4934-84CB-8EF94422C604}" type="datetimeFigureOut">
               <a:rPr lang="en-US" smtClean="0"/>
               <a:pPr/>
-              <a:t>9/28/2018</a:t>
+              <a:t>10/4/2018</a:t>
             </a:fld>
             <a:endParaRPr lang="en-US"/>
           </a:p>
@@ -2691,7 +3126,7 @@
             <a:fld id="{A9953F39-409C-4934-84CB-8EF94422C604}" type="datetimeFigureOut">
               <a:rPr lang="en-US" smtClean="0"/>
               <a:pPr/>
-              <a:t>9/28/2018</a:t>
+              <a:t>10/4/2018</a:t>
             </a:fld>
             <a:endParaRPr lang="en-US"/>
           </a:p>
@@ -4575,44 +5010,1397 @@
           <a:chExt cx="0" cy="0"/>
         </a:xfrm>
       </p:grpSpPr>
-      <p:sp>
-        <p:nvSpPr>
-          <p:cNvPr id="2" name="Oval 1"/>
-          <p:cNvSpPr/>
+      <p:grpSp>
+        <p:nvGrpSpPr>
+          <p:cNvPr id="42" name="Group 41"/>
+          <p:cNvGrpSpPr/>
           <p:nvPr/>
-        </p:nvSpPr>
-        <p:spPr>
+        </p:nvGrpSpPr>
+        <p:grpSpPr>
           <a:xfrm>
-            <a:off x="1000108" y="1595414"/>
-            <a:ext cx="1143008" cy="500066"/>
+            <a:off x="1428736" y="809596"/>
+            <a:ext cx="3857652" cy="8929750"/>
+            <a:chOff x="1428736" y="809596"/>
+            <a:chExt cx="3857652" cy="8929750"/>
           </a:xfrm>
-          <a:prstGeom prst="ellipse">
-            <a:avLst/>
-          </a:prstGeom>
-        </p:spPr>
-        <p:style>
-          <a:lnRef idx="2">
-            <a:schemeClr val="dk1"/>
-          </a:lnRef>
-          <a:fillRef idx="1">
-            <a:schemeClr val="lt1"/>
-          </a:fillRef>
-          <a:effectRef idx="0">
-            <a:schemeClr val="dk1"/>
-          </a:effectRef>
-          <a:fontRef idx="minor">
-            <a:schemeClr val="dk1"/>
-          </a:fontRef>
-        </p:style>
-        <p:txBody>
-          <a:bodyPr rtlCol="0" anchor="ctr"/>
-          <a:lstStyle/>
-          <a:p>
-            <a:pPr algn="ctr"/>
-            <a:endParaRPr lang="en-US"/>
-          </a:p>
-        </p:txBody>
-      </p:sp>
+        </p:grpSpPr>
+        <p:grpSp>
+          <p:nvGrpSpPr>
+            <p:cNvPr id="68" name="Group 67"/>
+            <p:cNvGrpSpPr/>
+            <p:nvPr/>
+          </p:nvGrpSpPr>
+          <p:grpSpPr>
+            <a:xfrm>
+              <a:off x="1714488" y="809596"/>
+              <a:ext cx="3571900" cy="8929750"/>
+              <a:chOff x="1714488" y="809596"/>
+              <a:chExt cx="3571900" cy="8929750"/>
+            </a:xfrm>
+          </p:grpSpPr>
+          <p:sp>
+            <p:nvSpPr>
+              <p:cNvPr id="3" name="Oval 2"/>
+              <p:cNvSpPr/>
+              <p:nvPr/>
+            </p:nvSpPr>
+            <p:spPr>
+              <a:xfrm>
+                <a:off x="2643182" y="809596"/>
+                <a:ext cx="1071570" cy="500066"/>
+              </a:xfrm>
+              <a:prstGeom prst="ellipse">
+                <a:avLst/>
+              </a:prstGeom>
+            </p:spPr>
+            <p:style>
+              <a:lnRef idx="2">
+                <a:schemeClr val="dk1"/>
+              </a:lnRef>
+              <a:fillRef idx="1">
+                <a:schemeClr val="lt1"/>
+              </a:fillRef>
+              <a:effectRef idx="0">
+                <a:schemeClr val="dk1"/>
+              </a:effectRef>
+              <a:fontRef idx="minor">
+                <a:schemeClr val="dk1"/>
+              </a:fontRef>
+            </p:style>
+            <p:txBody>
+              <a:bodyPr rtlCol="0" anchor="ctr"/>
+              <a:lstStyle/>
+              <a:p>
+                <a:pPr algn="ctr"/>
+                <a:r>
+                  <a:rPr lang="en-IN" dirty="0" smtClean="0"/>
+                  <a:t>start</a:t>
+                </a:r>
+                <a:endParaRPr lang="en-US" dirty="0"/>
+              </a:p>
+            </p:txBody>
+          </p:sp>
+          <p:sp>
+            <p:nvSpPr>
+              <p:cNvPr id="4" name="Flowchart: Data 3"/>
+              <p:cNvSpPr/>
+              <p:nvPr/>
+            </p:nvSpPr>
+            <p:spPr>
+              <a:xfrm>
+                <a:off x="2524627" y="1488257"/>
+                <a:ext cx="1308680" cy="357190"/>
+              </a:xfrm>
+              <a:prstGeom prst="flowChartInputOutput">
+                <a:avLst/>
+              </a:prstGeom>
+            </p:spPr>
+            <p:style>
+              <a:lnRef idx="2">
+                <a:schemeClr val="dk1"/>
+              </a:lnRef>
+              <a:fillRef idx="1">
+                <a:schemeClr val="lt1"/>
+              </a:fillRef>
+              <a:effectRef idx="0">
+                <a:schemeClr val="dk1"/>
+              </a:effectRef>
+              <a:fontRef idx="minor">
+                <a:schemeClr val="dk1"/>
+              </a:fontRef>
+            </p:style>
+            <p:txBody>
+              <a:bodyPr wrap="none" rtlCol="0" anchor="ctr"/>
+              <a:lstStyle/>
+              <a:p>
+                <a:pPr algn="ctr"/>
+                <a:r>
+                  <a:rPr lang="en-IN" dirty="0" smtClean="0"/>
+                  <a:t>read x</a:t>
+                </a:r>
+                <a:endParaRPr lang="en-US" dirty="0"/>
+              </a:p>
+            </p:txBody>
+          </p:sp>
+          <p:sp>
+            <p:nvSpPr>
+              <p:cNvPr id="5" name="Rectangle 4"/>
+              <p:cNvSpPr/>
+              <p:nvPr/>
+            </p:nvSpPr>
+            <p:spPr>
+              <a:xfrm>
+                <a:off x="2678901" y="2024042"/>
+                <a:ext cx="1000132" cy="357190"/>
+              </a:xfrm>
+              <a:prstGeom prst="rect">
+                <a:avLst/>
+              </a:prstGeom>
+            </p:spPr>
+            <p:style>
+              <a:lnRef idx="2">
+                <a:schemeClr val="dk1"/>
+              </a:lnRef>
+              <a:fillRef idx="1">
+                <a:schemeClr val="lt1"/>
+              </a:fillRef>
+              <a:effectRef idx="0">
+                <a:schemeClr val="dk1"/>
+              </a:effectRef>
+              <a:fontRef idx="minor">
+                <a:schemeClr val="dk1"/>
+              </a:fontRef>
+            </p:style>
+            <p:txBody>
+              <a:bodyPr wrap="none" rtlCol="0" anchor="ctr"/>
+              <a:lstStyle/>
+              <a:p>
+                <a:pPr algn="ctr"/>
+                <a:r>
+                  <a:rPr lang="en-IN" dirty="0" err="1" smtClean="0"/>
+                  <a:t>i</a:t>
+                </a:r>
+                <a:r>
+                  <a:rPr lang="en-IN" dirty="0" smtClean="0"/>
+                  <a:t> = 0 </a:t>
+                </a:r>
+                <a:endParaRPr lang="en-US" dirty="0"/>
+              </a:p>
+            </p:txBody>
+          </p:sp>
+          <p:sp>
+            <p:nvSpPr>
+              <p:cNvPr id="6" name="Flowchart: Decision 5"/>
+              <p:cNvSpPr/>
+              <p:nvPr/>
+            </p:nvSpPr>
+            <p:spPr>
+              <a:xfrm>
+                <a:off x="2464587" y="2559827"/>
+                <a:ext cx="1428760" cy="642942"/>
+              </a:xfrm>
+              <a:prstGeom prst="flowChartDecision">
+                <a:avLst/>
+              </a:prstGeom>
+            </p:spPr>
+            <p:style>
+              <a:lnRef idx="2">
+                <a:schemeClr val="dk1"/>
+              </a:lnRef>
+              <a:fillRef idx="1">
+                <a:schemeClr val="lt1"/>
+              </a:fillRef>
+              <a:effectRef idx="0">
+                <a:schemeClr val="dk1"/>
+              </a:effectRef>
+              <a:fontRef idx="minor">
+                <a:schemeClr val="dk1"/>
+              </a:fontRef>
+            </p:style>
+            <p:txBody>
+              <a:bodyPr wrap="none" rtlCol="0" anchor="ctr"/>
+              <a:lstStyle/>
+              <a:p>
+                <a:pPr algn="ctr"/>
+                <a:r>
+                  <a:rPr lang="en-IN" dirty="0" err="1" smtClean="0"/>
+                  <a:t>i</a:t>
+                </a:r>
+                <a:r>
+                  <a:rPr lang="en-IN" dirty="0" smtClean="0"/>
+                  <a:t> &lt; 101</a:t>
+                </a:r>
+                <a:endParaRPr lang="en-US" dirty="0"/>
+              </a:p>
+            </p:txBody>
+          </p:sp>
+          <p:sp>
+            <p:nvSpPr>
+              <p:cNvPr id="7" name="Rectangle 6"/>
+              <p:cNvSpPr/>
+              <p:nvPr/>
+            </p:nvSpPr>
+            <p:spPr>
+              <a:xfrm>
+                <a:off x="2393149" y="3381364"/>
+                <a:ext cx="1571636" cy="1214446"/>
+              </a:xfrm>
+              <a:prstGeom prst="rect">
+                <a:avLst/>
+              </a:prstGeom>
+            </p:spPr>
+            <p:style>
+              <a:lnRef idx="2">
+                <a:schemeClr val="dk1"/>
+              </a:lnRef>
+              <a:fillRef idx="1">
+                <a:schemeClr val="lt1"/>
+              </a:fillRef>
+              <a:effectRef idx="0">
+                <a:schemeClr val="dk1"/>
+              </a:effectRef>
+              <a:fontRef idx="minor">
+                <a:schemeClr val="dk1"/>
+              </a:fontRef>
+            </p:style>
+            <p:txBody>
+              <a:bodyPr wrap="none" rtlCol="0" anchor="ctr"/>
+              <a:lstStyle/>
+              <a:p>
+                <a:r>
+                  <a:rPr lang="en-US" dirty="0" smtClean="0"/>
+                  <a:t>power = I</a:t>
+                </a:r>
+              </a:p>
+              <a:p>
+                <a:r>
+                  <a:rPr lang="en-US" dirty="0" smtClean="0"/>
+                  <a:t>fact = power</a:t>
+                </a:r>
+              </a:p>
+              <a:p>
+                <a:r>
+                  <a:rPr lang="en-US" dirty="0" err="1" smtClean="0"/>
+                  <a:t>pow_result</a:t>
+                </a:r>
+                <a:r>
+                  <a:rPr lang="en-US" dirty="0" smtClean="0"/>
+                  <a:t> = 1</a:t>
+                </a:r>
+              </a:p>
+              <a:p>
+                <a:r>
+                  <a:rPr lang="en-US" dirty="0" err="1" smtClean="0"/>
+                  <a:t>fact_result</a:t>
+                </a:r>
+                <a:r>
+                  <a:rPr lang="en-US" dirty="0" smtClean="0"/>
+                  <a:t> = 1</a:t>
+                </a:r>
+                <a:endParaRPr lang="en-US" dirty="0"/>
+              </a:p>
+            </p:txBody>
+          </p:sp>
+          <p:sp>
+            <p:nvSpPr>
+              <p:cNvPr id="9" name="Flowchart: Decision 8"/>
+              <p:cNvSpPr/>
+              <p:nvPr/>
+            </p:nvSpPr>
+            <p:spPr>
+              <a:xfrm>
+                <a:off x="2214554" y="6131727"/>
+                <a:ext cx="1928826" cy="714380"/>
+              </a:xfrm>
+              <a:prstGeom prst="flowChartDecision">
+                <a:avLst/>
+              </a:prstGeom>
+            </p:spPr>
+            <p:style>
+              <a:lnRef idx="2">
+                <a:schemeClr val="dk1"/>
+              </a:lnRef>
+              <a:fillRef idx="1">
+                <a:schemeClr val="lt1"/>
+              </a:fillRef>
+              <a:effectRef idx="0">
+                <a:schemeClr val="dk1"/>
+              </a:effectRef>
+              <a:fontRef idx="minor">
+                <a:schemeClr val="dk1"/>
+              </a:fontRef>
+            </p:style>
+            <p:txBody>
+              <a:bodyPr wrap="none" rtlCol="0" anchor="ctr"/>
+              <a:lstStyle/>
+              <a:p>
+                <a:pPr algn="ctr"/>
+                <a:r>
+                  <a:rPr lang="en-IN" dirty="0" smtClean="0"/>
+                  <a:t>power ! = 0 </a:t>
+                </a:r>
+                <a:endParaRPr lang="en-US" dirty="0"/>
+              </a:p>
+            </p:txBody>
+          </p:sp>
+          <p:sp>
+            <p:nvSpPr>
+              <p:cNvPr id="10" name="Rectangle 9"/>
+              <p:cNvSpPr/>
+              <p:nvPr/>
+            </p:nvSpPr>
+            <p:spPr>
+              <a:xfrm>
+                <a:off x="1785926" y="4774405"/>
+                <a:ext cx="2786082" cy="500066"/>
+              </a:xfrm>
+              <a:prstGeom prst="rect">
+                <a:avLst/>
+              </a:prstGeom>
+            </p:spPr>
+            <p:style>
+              <a:lnRef idx="2">
+                <a:schemeClr val="dk1"/>
+              </a:lnRef>
+              <a:fillRef idx="1">
+                <a:schemeClr val="lt1"/>
+              </a:fillRef>
+              <a:effectRef idx="0">
+                <a:schemeClr val="dk1"/>
+              </a:effectRef>
+              <a:fontRef idx="minor">
+                <a:schemeClr val="dk1"/>
+              </a:fontRef>
+            </p:style>
+            <p:txBody>
+              <a:bodyPr wrap="none" rtlCol="0" anchor="ctr"/>
+              <a:lstStyle/>
+              <a:p>
+                <a:r>
+                  <a:rPr lang="en-US" dirty="0" err="1" smtClean="0"/>
+                  <a:t>pow_result</a:t>
+                </a:r>
+                <a:r>
+                  <a:rPr lang="en-US" dirty="0" smtClean="0"/>
+                  <a:t> = </a:t>
+                </a:r>
+                <a:r>
+                  <a:rPr lang="en-US" dirty="0" err="1" smtClean="0"/>
+                  <a:t>pow_result</a:t>
+                </a:r>
+                <a:r>
+                  <a:rPr lang="en-US" dirty="0" smtClean="0"/>
+                  <a:t> *x </a:t>
+                </a:r>
+              </a:p>
+            </p:txBody>
+          </p:sp>
+          <p:sp>
+            <p:nvSpPr>
+              <p:cNvPr id="11" name="Rectangle 10"/>
+              <p:cNvSpPr/>
+              <p:nvPr/>
+            </p:nvSpPr>
+            <p:spPr>
+              <a:xfrm>
+                <a:off x="2250273" y="5453066"/>
+                <a:ext cx="1857388" cy="500066"/>
+              </a:xfrm>
+              <a:prstGeom prst="rect">
+                <a:avLst/>
+              </a:prstGeom>
+            </p:spPr>
+            <p:style>
+              <a:lnRef idx="2">
+                <a:schemeClr val="dk1"/>
+              </a:lnRef>
+              <a:fillRef idx="1">
+                <a:schemeClr val="lt1"/>
+              </a:fillRef>
+              <a:effectRef idx="0">
+                <a:schemeClr val="dk1"/>
+              </a:effectRef>
+              <a:fontRef idx="minor">
+                <a:schemeClr val="dk1"/>
+              </a:fontRef>
+            </p:style>
+            <p:txBody>
+              <a:bodyPr wrap="none" rtlCol="0" anchor="ctr"/>
+              <a:lstStyle/>
+              <a:p>
+                <a:r>
+                  <a:rPr lang="en-US" dirty="0" smtClean="0"/>
+                  <a:t>power = power - 1 </a:t>
+                </a:r>
+              </a:p>
+            </p:txBody>
+          </p:sp>
+          <p:sp>
+            <p:nvSpPr>
+              <p:cNvPr id="12" name="Flowchart: Decision 11"/>
+              <p:cNvSpPr/>
+              <p:nvPr/>
+            </p:nvSpPr>
+            <p:spPr>
+              <a:xfrm>
+                <a:off x="2214554" y="8382024"/>
+                <a:ext cx="1928826" cy="714380"/>
+              </a:xfrm>
+              <a:prstGeom prst="flowChartDecision">
+                <a:avLst/>
+              </a:prstGeom>
+            </p:spPr>
+            <p:style>
+              <a:lnRef idx="2">
+                <a:schemeClr val="dk1"/>
+              </a:lnRef>
+              <a:fillRef idx="1">
+                <a:schemeClr val="lt1"/>
+              </a:fillRef>
+              <a:effectRef idx="0">
+                <a:schemeClr val="dk1"/>
+              </a:effectRef>
+              <a:fontRef idx="minor">
+                <a:schemeClr val="dk1"/>
+              </a:fontRef>
+            </p:style>
+            <p:txBody>
+              <a:bodyPr wrap="none" rtlCol="0" anchor="ctr"/>
+              <a:lstStyle/>
+              <a:p>
+                <a:pPr algn="ctr"/>
+                <a:r>
+                  <a:rPr lang="en-IN" dirty="0" smtClean="0"/>
+                  <a:t>fact ! = 0 </a:t>
+                </a:r>
+                <a:endParaRPr lang="en-US" dirty="0"/>
+              </a:p>
+            </p:txBody>
+          </p:sp>
+          <p:sp>
+            <p:nvSpPr>
+              <p:cNvPr id="13" name="Rectangle 12"/>
+              <p:cNvSpPr/>
+              <p:nvPr/>
+            </p:nvSpPr>
+            <p:spPr>
+              <a:xfrm>
+                <a:off x="1714488" y="7024702"/>
+                <a:ext cx="2928958" cy="500066"/>
+              </a:xfrm>
+              <a:prstGeom prst="rect">
+                <a:avLst/>
+              </a:prstGeom>
+            </p:spPr>
+            <p:style>
+              <a:lnRef idx="2">
+                <a:schemeClr val="dk1"/>
+              </a:lnRef>
+              <a:fillRef idx="1">
+                <a:schemeClr val="lt1"/>
+              </a:fillRef>
+              <a:effectRef idx="0">
+                <a:schemeClr val="dk1"/>
+              </a:effectRef>
+              <a:fontRef idx="minor">
+                <a:schemeClr val="dk1"/>
+              </a:fontRef>
+            </p:style>
+            <p:txBody>
+              <a:bodyPr wrap="none" rtlCol="0" anchor="ctr"/>
+              <a:lstStyle/>
+              <a:p>
+                <a:r>
+                  <a:rPr lang="en-US" dirty="0" err="1" smtClean="0"/>
+                  <a:t>fact_result</a:t>
+                </a:r>
+                <a:r>
+                  <a:rPr lang="en-US" dirty="0" smtClean="0"/>
+                  <a:t> = </a:t>
+                </a:r>
+                <a:r>
+                  <a:rPr lang="en-US" dirty="0" err="1" smtClean="0"/>
+                  <a:t>fact_result</a:t>
+                </a:r>
+                <a:r>
+                  <a:rPr lang="en-US" dirty="0" smtClean="0"/>
+                  <a:t> *fact</a:t>
+                </a:r>
+              </a:p>
+            </p:txBody>
+          </p:sp>
+          <p:sp>
+            <p:nvSpPr>
+              <p:cNvPr id="14" name="Rectangle 13"/>
+              <p:cNvSpPr/>
+              <p:nvPr/>
+            </p:nvSpPr>
+            <p:spPr>
+              <a:xfrm>
+                <a:off x="2464587" y="7703363"/>
+                <a:ext cx="1428760" cy="500066"/>
+              </a:xfrm>
+              <a:prstGeom prst="rect">
+                <a:avLst/>
+              </a:prstGeom>
+            </p:spPr>
+            <p:style>
+              <a:lnRef idx="2">
+                <a:schemeClr val="dk1"/>
+              </a:lnRef>
+              <a:fillRef idx="1">
+                <a:schemeClr val="lt1"/>
+              </a:fillRef>
+              <a:effectRef idx="0">
+                <a:schemeClr val="dk1"/>
+              </a:effectRef>
+              <a:fontRef idx="minor">
+                <a:schemeClr val="dk1"/>
+              </a:fontRef>
+            </p:style>
+            <p:txBody>
+              <a:bodyPr wrap="none" rtlCol="0" anchor="ctr"/>
+              <a:lstStyle/>
+              <a:p>
+                <a:r>
+                  <a:rPr lang="en-US" dirty="0" smtClean="0"/>
+                  <a:t>fact = fact- 1 </a:t>
+                </a:r>
+              </a:p>
+            </p:txBody>
+          </p:sp>
+          <p:cxnSp>
+            <p:nvCxnSpPr>
+              <p:cNvPr id="18" name="Straight Arrow Connector 17"/>
+              <p:cNvCxnSpPr>
+                <a:stCxn id="3" idx="4"/>
+                <a:endCxn id="4" idx="1"/>
+              </p:cNvCxnSpPr>
+              <p:nvPr/>
+            </p:nvCxnSpPr>
+            <p:spPr>
+              <a:xfrm rot="5400000">
+                <a:off x="3089670" y="1398959"/>
+                <a:ext cx="178595" cy="1588"/>
+              </a:xfrm>
+              <a:prstGeom prst="straightConnector1">
+                <a:avLst/>
+              </a:prstGeom>
+              <a:ln>
+                <a:tailEnd type="arrow"/>
+              </a:ln>
+            </p:spPr>
+            <p:style>
+              <a:lnRef idx="1">
+                <a:schemeClr val="dk1"/>
+              </a:lnRef>
+              <a:fillRef idx="0">
+                <a:schemeClr val="dk1"/>
+              </a:fillRef>
+              <a:effectRef idx="0">
+                <a:schemeClr val="dk1"/>
+              </a:effectRef>
+              <a:fontRef idx="minor">
+                <a:schemeClr val="tx1"/>
+              </a:fontRef>
+            </p:style>
+          </p:cxnSp>
+          <p:cxnSp>
+            <p:nvCxnSpPr>
+              <p:cNvPr id="19" name="Straight Arrow Connector 18"/>
+              <p:cNvCxnSpPr>
+                <a:stCxn id="4" idx="4"/>
+                <a:endCxn id="5" idx="0"/>
+              </p:cNvCxnSpPr>
+              <p:nvPr/>
+            </p:nvCxnSpPr>
+            <p:spPr>
+              <a:xfrm rot="5400000">
+                <a:off x="3089670" y="1934744"/>
+                <a:ext cx="178595" cy="1588"/>
+              </a:xfrm>
+              <a:prstGeom prst="straightConnector1">
+                <a:avLst/>
+              </a:prstGeom>
+              <a:ln>
+                <a:tailEnd type="arrow"/>
+              </a:ln>
+            </p:spPr>
+            <p:style>
+              <a:lnRef idx="1">
+                <a:schemeClr val="dk1"/>
+              </a:lnRef>
+              <a:fillRef idx="0">
+                <a:schemeClr val="dk1"/>
+              </a:fillRef>
+              <a:effectRef idx="0">
+                <a:schemeClr val="dk1"/>
+              </a:effectRef>
+              <a:fontRef idx="minor">
+                <a:schemeClr val="tx1"/>
+              </a:fontRef>
+            </p:style>
+          </p:cxnSp>
+          <p:cxnSp>
+            <p:nvCxnSpPr>
+              <p:cNvPr id="22" name="Straight Arrow Connector 21"/>
+              <p:cNvCxnSpPr>
+                <a:stCxn id="5" idx="2"/>
+                <a:endCxn id="6" idx="0"/>
+              </p:cNvCxnSpPr>
+              <p:nvPr/>
+            </p:nvCxnSpPr>
+            <p:spPr>
+              <a:xfrm rot="5400000">
+                <a:off x="3089670" y="2470529"/>
+                <a:ext cx="178595" cy="1588"/>
+              </a:xfrm>
+              <a:prstGeom prst="straightConnector1">
+                <a:avLst/>
+              </a:prstGeom>
+              <a:ln>
+                <a:tailEnd type="arrow"/>
+              </a:ln>
+            </p:spPr>
+            <p:style>
+              <a:lnRef idx="1">
+                <a:schemeClr val="dk1"/>
+              </a:lnRef>
+              <a:fillRef idx="0">
+                <a:schemeClr val="dk1"/>
+              </a:fillRef>
+              <a:effectRef idx="0">
+                <a:schemeClr val="dk1"/>
+              </a:effectRef>
+              <a:fontRef idx="minor">
+                <a:schemeClr val="tx1"/>
+              </a:fontRef>
+            </p:style>
+          </p:cxnSp>
+          <p:cxnSp>
+            <p:nvCxnSpPr>
+              <p:cNvPr id="25" name="Straight Arrow Connector 24"/>
+              <p:cNvCxnSpPr>
+                <a:stCxn id="6" idx="2"/>
+                <a:endCxn id="7" idx="0"/>
+              </p:cNvCxnSpPr>
+              <p:nvPr/>
+            </p:nvCxnSpPr>
+            <p:spPr>
+              <a:xfrm rot="5400000">
+                <a:off x="3089670" y="3292066"/>
+                <a:ext cx="178595" cy="1588"/>
+              </a:xfrm>
+              <a:prstGeom prst="straightConnector1">
+                <a:avLst/>
+              </a:prstGeom>
+              <a:ln>
+                <a:tailEnd type="arrow"/>
+              </a:ln>
+            </p:spPr>
+            <p:style>
+              <a:lnRef idx="1">
+                <a:schemeClr val="dk1"/>
+              </a:lnRef>
+              <a:fillRef idx="0">
+                <a:schemeClr val="dk1"/>
+              </a:fillRef>
+              <a:effectRef idx="0">
+                <a:schemeClr val="dk1"/>
+              </a:effectRef>
+              <a:fontRef idx="minor">
+                <a:schemeClr val="tx1"/>
+              </a:fontRef>
+            </p:style>
+          </p:cxnSp>
+          <p:cxnSp>
+            <p:nvCxnSpPr>
+              <p:cNvPr id="28" name="Straight Arrow Connector 27"/>
+              <p:cNvCxnSpPr>
+                <a:stCxn id="7" idx="2"/>
+                <a:endCxn id="10" idx="0"/>
+              </p:cNvCxnSpPr>
+              <p:nvPr/>
+            </p:nvCxnSpPr>
+            <p:spPr>
+              <a:xfrm rot="5400000">
+                <a:off x="3089670" y="4685107"/>
+                <a:ext cx="178595" cy="1588"/>
+              </a:xfrm>
+              <a:prstGeom prst="straightConnector1">
+                <a:avLst/>
+              </a:prstGeom>
+              <a:ln>
+                <a:tailEnd type="arrow"/>
+              </a:ln>
+            </p:spPr>
+            <p:style>
+              <a:lnRef idx="1">
+                <a:schemeClr val="dk1"/>
+              </a:lnRef>
+              <a:fillRef idx="0">
+                <a:schemeClr val="dk1"/>
+              </a:fillRef>
+              <a:effectRef idx="0">
+                <a:schemeClr val="dk1"/>
+              </a:effectRef>
+              <a:fontRef idx="minor">
+                <a:schemeClr val="tx1"/>
+              </a:fontRef>
+            </p:style>
+          </p:cxnSp>
+          <p:cxnSp>
+            <p:nvCxnSpPr>
+              <p:cNvPr id="31" name="Straight Arrow Connector 30"/>
+              <p:cNvCxnSpPr>
+                <a:stCxn id="10" idx="2"/>
+                <a:endCxn id="11" idx="0"/>
+              </p:cNvCxnSpPr>
+              <p:nvPr/>
+            </p:nvCxnSpPr>
+            <p:spPr>
+              <a:xfrm rot="5400000">
+                <a:off x="3089670" y="5363768"/>
+                <a:ext cx="178595" cy="1588"/>
+              </a:xfrm>
+              <a:prstGeom prst="straightConnector1">
+                <a:avLst/>
+              </a:prstGeom>
+              <a:ln>
+                <a:tailEnd type="arrow"/>
+              </a:ln>
+            </p:spPr>
+            <p:style>
+              <a:lnRef idx="1">
+                <a:schemeClr val="dk1"/>
+              </a:lnRef>
+              <a:fillRef idx="0">
+                <a:schemeClr val="dk1"/>
+              </a:fillRef>
+              <a:effectRef idx="0">
+                <a:schemeClr val="dk1"/>
+              </a:effectRef>
+              <a:fontRef idx="minor">
+                <a:schemeClr val="tx1"/>
+              </a:fontRef>
+            </p:style>
+          </p:cxnSp>
+          <p:cxnSp>
+            <p:nvCxnSpPr>
+              <p:cNvPr id="34" name="Straight Arrow Connector 33"/>
+              <p:cNvCxnSpPr>
+                <a:stCxn id="11" idx="2"/>
+                <a:endCxn id="9" idx="0"/>
+              </p:cNvCxnSpPr>
+              <p:nvPr/>
+            </p:nvCxnSpPr>
+            <p:spPr>
+              <a:xfrm rot="5400000">
+                <a:off x="3089670" y="6042429"/>
+                <a:ext cx="178595" cy="1588"/>
+              </a:xfrm>
+              <a:prstGeom prst="straightConnector1">
+                <a:avLst/>
+              </a:prstGeom>
+              <a:ln>
+                <a:tailEnd type="arrow"/>
+              </a:ln>
+            </p:spPr>
+            <p:style>
+              <a:lnRef idx="1">
+                <a:schemeClr val="dk1"/>
+              </a:lnRef>
+              <a:fillRef idx="0">
+                <a:schemeClr val="dk1"/>
+              </a:fillRef>
+              <a:effectRef idx="0">
+                <a:schemeClr val="dk1"/>
+              </a:effectRef>
+              <a:fontRef idx="minor">
+                <a:schemeClr val="tx1"/>
+              </a:fontRef>
+            </p:style>
+          </p:cxnSp>
+          <p:cxnSp>
+            <p:nvCxnSpPr>
+              <p:cNvPr id="37" name="Straight Arrow Connector 36"/>
+              <p:cNvCxnSpPr>
+                <a:stCxn id="9" idx="2"/>
+                <a:endCxn id="13" idx="0"/>
+              </p:cNvCxnSpPr>
+              <p:nvPr/>
+            </p:nvCxnSpPr>
+            <p:spPr>
+              <a:xfrm rot="5400000">
+                <a:off x="3089670" y="6935404"/>
+                <a:ext cx="178595" cy="1588"/>
+              </a:xfrm>
+              <a:prstGeom prst="straightConnector1">
+                <a:avLst/>
+              </a:prstGeom>
+              <a:ln>
+                <a:tailEnd type="arrow"/>
+              </a:ln>
+            </p:spPr>
+            <p:style>
+              <a:lnRef idx="1">
+                <a:schemeClr val="dk1"/>
+              </a:lnRef>
+              <a:fillRef idx="0">
+                <a:schemeClr val="dk1"/>
+              </a:fillRef>
+              <a:effectRef idx="0">
+                <a:schemeClr val="dk1"/>
+              </a:effectRef>
+              <a:fontRef idx="minor">
+                <a:schemeClr val="tx1"/>
+              </a:fontRef>
+            </p:style>
+          </p:cxnSp>
+          <p:cxnSp>
+            <p:nvCxnSpPr>
+              <p:cNvPr id="41" name="Straight Arrow Connector 40"/>
+              <p:cNvCxnSpPr>
+                <a:stCxn id="13" idx="2"/>
+                <a:endCxn id="14" idx="0"/>
+              </p:cNvCxnSpPr>
+              <p:nvPr/>
+            </p:nvCxnSpPr>
+            <p:spPr>
+              <a:xfrm rot="5400000">
+                <a:off x="3089670" y="7614065"/>
+                <a:ext cx="178595" cy="1588"/>
+              </a:xfrm>
+              <a:prstGeom prst="straightConnector1">
+                <a:avLst/>
+              </a:prstGeom>
+              <a:ln>
+                <a:tailEnd type="arrow"/>
+              </a:ln>
+            </p:spPr>
+            <p:style>
+              <a:lnRef idx="1">
+                <a:schemeClr val="dk1"/>
+              </a:lnRef>
+              <a:fillRef idx="0">
+                <a:schemeClr val="dk1"/>
+              </a:fillRef>
+              <a:effectRef idx="0">
+                <a:schemeClr val="dk1"/>
+              </a:effectRef>
+              <a:fontRef idx="minor">
+                <a:schemeClr val="tx1"/>
+              </a:fontRef>
+            </p:style>
+          </p:cxnSp>
+          <p:cxnSp>
+            <p:nvCxnSpPr>
+              <p:cNvPr id="44" name="Straight Arrow Connector 43"/>
+              <p:cNvCxnSpPr>
+                <a:stCxn id="14" idx="2"/>
+                <a:endCxn id="12" idx="0"/>
+              </p:cNvCxnSpPr>
+              <p:nvPr/>
+            </p:nvCxnSpPr>
+            <p:spPr>
+              <a:xfrm rot="5400000">
+                <a:off x="3089670" y="8292726"/>
+                <a:ext cx="178595" cy="1588"/>
+              </a:xfrm>
+              <a:prstGeom prst="straightConnector1">
+                <a:avLst/>
+              </a:prstGeom>
+              <a:ln>
+                <a:tailEnd type="arrow"/>
+              </a:ln>
+            </p:spPr>
+            <p:style>
+              <a:lnRef idx="1">
+                <a:schemeClr val="dk1"/>
+              </a:lnRef>
+              <a:fillRef idx="0">
+                <a:schemeClr val="dk1"/>
+              </a:fillRef>
+              <a:effectRef idx="0">
+                <a:schemeClr val="dk1"/>
+              </a:effectRef>
+              <a:fontRef idx="minor">
+                <a:schemeClr val="tx1"/>
+              </a:fontRef>
+            </p:style>
+          </p:cxnSp>
+          <p:sp>
+            <p:nvSpPr>
+              <p:cNvPr id="47" name="Oval 46"/>
+              <p:cNvSpPr/>
+              <p:nvPr/>
+            </p:nvSpPr>
+            <p:spPr>
+              <a:xfrm>
+                <a:off x="2962272" y="9310718"/>
+                <a:ext cx="428628" cy="428628"/>
+              </a:xfrm>
+              <a:prstGeom prst="ellipse">
+                <a:avLst/>
+              </a:prstGeom>
+            </p:spPr>
+            <p:style>
+              <a:lnRef idx="2">
+                <a:schemeClr val="dk1"/>
+              </a:lnRef>
+              <a:fillRef idx="1">
+                <a:schemeClr val="lt1"/>
+              </a:fillRef>
+              <a:effectRef idx="0">
+                <a:schemeClr val="dk1"/>
+              </a:effectRef>
+              <a:fontRef idx="minor">
+                <a:schemeClr val="dk1"/>
+              </a:fontRef>
+            </p:style>
+            <p:txBody>
+              <a:bodyPr rtlCol="0" anchor="ctr"/>
+              <a:lstStyle/>
+              <a:p>
+                <a:pPr algn="ctr"/>
+                <a:r>
+                  <a:rPr lang="en-IN" dirty="0" smtClean="0"/>
+                  <a:t>A</a:t>
+                </a:r>
+                <a:endParaRPr lang="en-US" dirty="0"/>
+              </a:p>
+            </p:txBody>
+          </p:sp>
+          <p:cxnSp>
+            <p:nvCxnSpPr>
+              <p:cNvPr id="48" name="Straight Arrow Connector 47"/>
+              <p:cNvCxnSpPr>
+                <a:stCxn id="12" idx="2"/>
+                <a:endCxn id="47" idx="0"/>
+              </p:cNvCxnSpPr>
+              <p:nvPr/>
+            </p:nvCxnSpPr>
+            <p:spPr>
+              <a:xfrm rot="5400000">
+                <a:off x="3070620" y="9202371"/>
+                <a:ext cx="214314" cy="2381"/>
+              </a:xfrm>
+              <a:prstGeom prst="straightConnector1">
+                <a:avLst/>
+              </a:prstGeom>
+              <a:ln>
+                <a:tailEnd type="arrow"/>
+              </a:ln>
+            </p:spPr>
+            <p:style>
+              <a:lnRef idx="1">
+                <a:schemeClr val="dk1"/>
+              </a:lnRef>
+              <a:fillRef idx="0">
+                <a:schemeClr val="dk1"/>
+              </a:fillRef>
+              <a:effectRef idx="0">
+                <a:schemeClr val="dk1"/>
+              </a:effectRef>
+              <a:fontRef idx="minor">
+                <a:schemeClr val="tx1"/>
+              </a:fontRef>
+            </p:style>
+          </p:cxnSp>
+          <p:sp>
+            <p:nvSpPr>
+              <p:cNvPr id="52" name="Oval 51"/>
+              <p:cNvSpPr/>
+              <p:nvPr/>
+            </p:nvSpPr>
+            <p:spPr>
+              <a:xfrm>
+                <a:off x="4857760" y="2666984"/>
+                <a:ext cx="428628" cy="428628"/>
+              </a:xfrm>
+              <a:prstGeom prst="ellipse">
+                <a:avLst/>
+              </a:prstGeom>
+            </p:spPr>
+            <p:style>
+              <a:lnRef idx="2">
+                <a:schemeClr val="dk1"/>
+              </a:lnRef>
+              <a:fillRef idx="1">
+                <a:schemeClr val="lt1"/>
+              </a:fillRef>
+              <a:effectRef idx="0">
+                <a:schemeClr val="dk1"/>
+              </a:effectRef>
+              <a:fontRef idx="minor">
+                <a:schemeClr val="dk1"/>
+              </a:fontRef>
+            </p:style>
+            <p:txBody>
+              <a:bodyPr rtlCol="0" anchor="ctr"/>
+              <a:lstStyle/>
+              <a:p>
+                <a:pPr algn="ctr"/>
+                <a:r>
+                  <a:rPr lang="en-IN" dirty="0" smtClean="0"/>
+                  <a:t>B</a:t>
+                </a:r>
+                <a:endParaRPr lang="en-US" dirty="0"/>
+              </a:p>
+            </p:txBody>
+          </p:sp>
+          <p:cxnSp>
+            <p:nvCxnSpPr>
+              <p:cNvPr id="53" name="Straight Arrow Connector 52"/>
+              <p:cNvCxnSpPr>
+                <a:stCxn id="6" idx="3"/>
+                <a:endCxn id="52" idx="2"/>
+              </p:cNvCxnSpPr>
+              <p:nvPr/>
+            </p:nvCxnSpPr>
+            <p:spPr>
+              <a:xfrm>
+                <a:off x="3893347" y="2881298"/>
+                <a:ext cx="964413" cy="1588"/>
+              </a:xfrm>
+              <a:prstGeom prst="straightConnector1">
+                <a:avLst/>
+              </a:prstGeom>
+              <a:ln>
+                <a:tailEnd type="arrow"/>
+              </a:ln>
+            </p:spPr>
+            <p:style>
+              <a:lnRef idx="1">
+                <a:schemeClr val="dk1"/>
+              </a:lnRef>
+              <a:fillRef idx="0">
+                <a:schemeClr val="dk1"/>
+              </a:fillRef>
+              <a:effectRef idx="0">
+                <a:schemeClr val="dk1"/>
+              </a:effectRef>
+              <a:fontRef idx="minor">
+                <a:schemeClr val="tx1"/>
+              </a:fontRef>
+            </p:style>
+          </p:cxnSp>
+          <p:cxnSp>
+            <p:nvCxnSpPr>
+              <p:cNvPr id="57" name="Elbow Connector 56"/>
+              <p:cNvCxnSpPr>
+                <a:stCxn id="9" idx="3"/>
+                <a:endCxn id="10" idx="3"/>
+              </p:cNvCxnSpPr>
+              <p:nvPr/>
+            </p:nvCxnSpPr>
+            <p:spPr>
+              <a:xfrm flipV="1">
+                <a:off x="4143380" y="5024438"/>
+                <a:ext cx="428628" cy="1464479"/>
+              </a:xfrm>
+              <a:prstGeom prst="bentConnector3">
+                <a:avLst>
+                  <a:gd name="adj1" fmla="val 153333"/>
+                </a:avLst>
+              </a:prstGeom>
+              <a:ln>
+                <a:tailEnd type="arrow"/>
+              </a:ln>
+            </p:spPr>
+            <p:style>
+              <a:lnRef idx="1">
+                <a:schemeClr val="dk1"/>
+              </a:lnRef>
+              <a:fillRef idx="0">
+                <a:schemeClr val="dk1"/>
+              </a:fillRef>
+              <a:effectRef idx="0">
+                <a:schemeClr val="dk1"/>
+              </a:effectRef>
+              <a:fontRef idx="minor">
+                <a:schemeClr val="tx1"/>
+              </a:fontRef>
+            </p:style>
+          </p:cxnSp>
+          <p:cxnSp>
+            <p:nvCxnSpPr>
+              <p:cNvPr id="61" name="Elbow Connector 60"/>
+              <p:cNvCxnSpPr>
+                <a:stCxn id="12" idx="3"/>
+                <a:endCxn id="13" idx="3"/>
+              </p:cNvCxnSpPr>
+              <p:nvPr/>
+            </p:nvCxnSpPr>
+            <p:spPr>
+              <a:xfrm flipV="1">
+                <a:off x="4143380" y="7274735"/>
+                <a:ext cx="500066" cy="1464479"/>
+              </a:xfrm>
+              <a:prstGeom prst="bentConnector3">
+                <a:avLst>
+                  <a:gd name="adj1" fmla="val 145714"/>
+                </a:avLst>
+              </a:prstGeom>
+              <a:ln>
+                <a:tailEnd type="arrow"/>
+              </a:ln>
+            </p:spPr>
+            <p:style>
+              <a:lnRef idx="1">
+                <a:schemeClr val="dk1"/>
+              </a:lnRef>
+              <a:fillRef idx="0">
+                <a:schemeClr val="dk1"/>
+              </a:fillRef>
+              <a:effectRef idx="0">
+                <a:schemeClr val="dk1"/>
+              </a:effectRef>
+              <a:fontRef idx="minor">
+                <a:schemeClr val="tx1"/>
+              </a:fontRef>
+            </p:style>
+          </p:cxnSp>
+          <p:sp>
+            <p:nvSpPr>
+              <p:cNvPr id="62" name="TextBox 61"/>
+              <p:cNvSpPr txBox="1"/>
+              <p:nvPr/>
+            </p:nvSpPr>
+            <p:spPr>
+              <a:xfrm>
+                <a:off x="4261435" y="6130033"/>
+                <a:ext cx="524887" cy="323165"/>
+              </a:xfrm>
+              <a:prstGeom prst="rect">
+                <a:avLst/>
+              </a:prstGeom>
+              <a:noFill/>
+            </p:spPr>
+            <p:txBody>
+              <a:bodyPr wrap="none" rtlCol="0">
+                <a:spAutoFit/>
+              </a:bodyPr>
+              <a:lstStyle/>
+              <a:p>
+                <a:r>
+                  <a:rPr lang="en-IN" sz="1500" i="1" dirty="0" smtClean="0"/>
+                  <a:t>True</a:t>
+                </a:r>
+                <a:endParaRPr lang="en-US" sz="1500" i="1" dirty="0"/>
+              </a:p>
+            </p:txBody>
+          </p:sp>
+          <p:sp>
+            <p:nvSpPr>
+              <p:cNvPr id="63" name="TextBox 62"/>
+              <p:cNvSpPr txBox="1"/>
+              <p:nvPr/>
+            </p:nvSpPr>
+            <p:spPr>
+              <a:xfrm>
+                <a:off x="4332873" y="8416049"/>
+                <a:ext cx="524887" cy="323165"/>
+              </a:xfrm>
+              <a:prstGeom prst="rect">
+                <a:avLst/>
+              </a:prstGeom>
+              <a:noFill/>
+            </p:spPr>
+            <p:txBody>
+              <a:bodyPr wrap="none" rtlCol="0">
+                <a:spAutoFit/>
+              </a:bodyPr>
+              <a:lstStyle/>
+              <a:p>
+                <a:r>
+                  <a:rPr lang="en-IN" sz="1500" i="1" dirty="0" smtClean="0"/>
+                  <a:t>True</a:t>
+                </a:r>
+                <a:endParaRPr lang="en-US" sz="1500" i="1" dirty="0"/>
+              </a:p>
+            </p:txBody>
+          </p:sp>
+          <p:sp>
+            <p:nvSpPr>
+              <p:cNvPr id="64" name="TextBox 63"/>
+              <p:cNvSpPr txBox="1"/>
+              <p:nvPr/>
+            </p:nvSpPr>
+            <p:spPr>
+              <a:xfrm>
+                <a:off x="3547055" y="6701537"/>
+                <a:ext cx="581185" cy="323165"/>
+              </a:xfrm>
+              <a:prstGeom prst="rect">
+                <a:avLst/>
+              </a:prstGeom>
+              <a:noFill/>
+            </p:spPr>
+            <p:txBody>
+              <a:bodyPr wrap="none" rtlCol="0">
+                <a:spAutoFit/>
+              </a:bodyPr>
+              <a:lstStyle/>
+              <a:p>
+                <a:r>
+                  <a:rPr lang="en-IN" sz="1500" i="1" dirty="0" smtClean="0"/>
+                  <a:t>False</a:t>
+                </a:r>
+                <a:endParaRPr lang="en-US" sz="1500" i="1" dirty="0"/>
+              </a:p>
+            </p:txBody>
+          </p:sp>
+          <p:sp>
+            <p:nvSpPr>
+              <p:cNvPr id="65" name="TextBox 64"/>
+              <p:cNvSpPr txBox="1"/>
+              <p:nvPr/>
+            </p:nvSpPr>
+            <p:spPr>
+              <a:xfrm>
+                <a:off x="3500438" y="8987553"/>
+                <a:ext cx="581185" cy="323165"/>
+              </a:xfrm>
+              <a:prstGeom prst="rect">
+                <a:avLst/>
+              </a:prstGeom>
+              <a:noFill/>
+            </p:spPr>
+            <p:txBody>
+              <a:bodyPr wrap="none" rtlCol="0">
+                <a:spAutoFit/>
+              </a:bodyPr>
+              <a:lstStyle/>
+              <a:p>
+                <a:r>
+                  <a:rPr lang="en-IN" sz="1500" i="1" dirty="0" smtClean="0"/>
+                  <a:t>False</a:t>
+                </a:r>
+                <a:endParaRPr lang="en-US" sz="1500" i="1" dirty="0"/>
+              </a:p>
+            </p:txBody>
+          </p:sp>
+          <p:sp>
+            <p:nvSpPr>
+              <p:cNvPr id="66" name="TextBox 65"/>
+              <p:cNvSpPr txBox="1"/>
+              <p:nvPr/>
+            </p:nvSpPr>
+            <p:spPr>
+              <a:xfrm>
+                <a:off x="4071942" y="2452670"/>
+                <a:ext cx="581185" cy="323165"/>
+              </a:xfrm>
+              <a:prstGeom prst="rect">
+                <a:avLst/>
+              </a:prstGeom>
+              <a:noFill/>
+            </p:spPr>
+            <p:txBody>
+              <a:bodyPr wrap="none" rtlCol="0">
+                <a:spAutoFit/>
+              </a:bodyPr>
+              <a:lstStyle/>
+              <a:p>
+                <a:r>
+                  <a:rPr lang="en-IN" sz="1500" i="1" dirty="0" smtClean="0"/>
+                  <a:t>False</a:t>
+                </a:r>
+                <a:endParaRPr lang="en-US" sz="1500" i="1" dirty="0"/>
+              </a:p>
+            </p:txBody>
+          </p:sp>
+          <p:sp>
+            <p:nvSpPr>
+              <p:cNvPr id="67" name="TextBox 66"/>
+              <p:cNvSpPr txBox="1"/>
+              <p:nvPr/>
+            </p:nvSpPr>
+            <p:spPr>
+              <a:xfrm>
+                <a:off x="3571876" y="3024174"/>
+                <a:ext cx="524887" cy="323165"/>
+              </a:xfrm>
+              <a:prstGeom prst="rect">
+                <a:avLst/>
+              </a:prstGeom>
+              <a:noFill/>
+            </p:spPr>
+            <p:txBody>
+              <a:bodyPr wrap="none" rtlCol="0">
+                <a:spAutoFit/>
+              </a:bodyPr>
+              <a:lstStyle/>
+              <a:p>
+                <a:r>
+                  <a:rPr lang="en-IN" sz="1500" i="1" dirty="0" smtClean="0"/>
+                  <a:t>True</a:t>
+                </a:r>
+                <a:endParaRPr lang="en-US" sz="1500" i="1" dirty="0"/>
+              </a:p>
+            </p:txBody>
+          </p:sp>
+        </p:grpSp>
+        <p:sp>
+          <p:nvSpPr>
+            <p:cNvPr id="36" name="Oval 35"/>
+            <p:cNvSpPr/>
+            <p:nvPr/>
+          </p:nvSpPr>
+          <p:spPr>
+            <a:xfrm>
+              <a:off x="1428736" y="2666984"/>
+              <a:ext cx="428628" cy="428628"/>
+            </a:xfrm>
+            <a:prstGeom prst="ellipse">
+              <a:avLst/>
+            </a:prstGeom>
+          </p:spPr>
+          <p:style>
+            <a:lnRef idx="2">
+              <a:schemeClr val="dk1"/>
+            </a:lnRef>
+            <a:fillRef idx="1">
+              <a:schemeClr val="lt1"/>
+            </a:fillRef>
+            <a:effectRef idx="0">
+              <a:schemeClr val="dk1"/>
+            </a:effectRef>
+            <a:fontRef idx="minor">
+              <a:schemeClr val="dk1"/>
+            </a:fontRef>
+          </p:style>
+          <p:txBody>
+            <a:bodyPr rtlCol="0" anchor="ctr"/>
+            <a:lstStyle/>
+            <a:p>
+              <a:pPr algn="ctr"/>
+              <a:r>
+                <a:rPr lang="en-IN" dirty="0" smtClean="0"/>
+                <a:t>C</a:t>
+              </a:r>
+              <a:endParaRPr lang="en-US" dirty="0"/>
+            </a:p>
+          </p:txBody>
+        </p:sp>
+        <p:cxnSp>
+          <p:nvCxnSpPr>
+            <p:cNvPr id="38" name="Straight Arrow Connector 37"/>
+            <p:cNvCxnSpPr>
+              <a:stCxn id="36" idx="6"/>
+              <a:endCxn id="6" idx="1"/>
+            </p:cNvCxnSpPr>
+            <p:nvPr/>
+          </p:nvCxnSpPr>
+          <p:spPr>
+            <a:xfrm>
+              <a:off x="1857364" y="2881298"/>
+              <a:ext cx="607223" cy="1588"/>
+            </a:xfrm>
+            <a:prstGeom prst="straightConnector1">
+              <a:avLst/>
+            </a:prstGeom>
+            <a:ln>
+              <a:tailEnd type="arrow"/>
+            </a:ln>
+          </p:spPr>
+          <p:style>
+            <a:lnRef idx="1">
+              <a:schemeClr val="dk1"/>
+            </a:lnRef>
+            <a:fillRef idx="0">
+              <a:schemeClr val="dk1"/>
+            </a:fillRef>
+            <a:effectRef idx="0">
+              <a:schemeClr val="dk1"/>
+            </a:effectRef>
+            <a:fontRef idx="minor">
+              <a:schemeClr val="tx1"/>
+            </a:fontRef>
+          </p:style>
+        </p:cxnSp>
+      </p:grpSp>
     </p:spTree>
   </p:cSld>
   <p:clrMapOvr>
@@ -4622,6 +6410,653 @@
 </file>
 
 <file path=ppt/slides/slide4.xml><?xml version="1.0" encoding="utf-8"?>
+<p:sld xmlns:a="http://schemas.openxmlformats.org/drawingml/2006/main" xmlns:r="http://schemas.openxmlformats.org/officeDocument/2006/relationships" xmlns:p="http://schemas.openxmlformats.org/presentationml/2006/main">
+  <p:cSld>
+    <p:spTree>
+      <p:nvGrpSpPr>
+        <p:cNvPr id="1" name=""/>
+        <p:cNvGrpSpPr/>
+        <p:nvPr/>
+      </p:nvGrpSpPr>
+      <p:grpSpPr>
+        <a:xfrm>
+          <a:off x="0" y="0"/>
+          <a:ext cx="0" cy="0"/>
+          <a:chOff x="0" y="0"/>
+          <a:chExt cx="0" cy="0"/>
+        </a:xfrm>
+      </p:grpSpPr>
+      <p:grpSp>
+        <p:nvGrpSpPr>
+          <p:cNvPr id="26" name="Group 25"/>
+          <p:cNvGrpSpPr/>
+          <p:nvPr/>
+        </p:nvGrpSpPr>
+        <p:grpSpPr>
+          <a:xfrm>
+            <a:off x="1214422" y="523844"/>
+            <a:ext cx="4143404" cy="4214842"/>
+            <a:chOff x="1214422" y="523844"/>
+            <a:chExt cx="4143404" cy="4214842"/>
+          </a:xfrm>
+        </p:grpSpPr>
+        <p:grpSp>
+          <p:nvGrpSpPr>
+            <p:cNvPr id="13" name="Group 12"/>
+            <p:cNvGrpSpPr/>
+            <p:nvPr/>
+          </p:nvGrpSpPr>
+          <p:grpSpPr>
+            <a:xfrm>
+              <a:off x="1214422" y="523844"/>
+              <a:ext cx="4143404" cy="4214842"/>
+              <a:chOff x="1214422" y="523844"/>
+              <a:chExt cx="4143404" cy="4214842"/>
+            </a:xfrm>
+          </p:grpSpPr>
+          <p:sp>
+            <p:nvSpPr>
+              <p:cNvPr id="2" name="Rectangle 1"/>
+              <p:cNvSpPr/>
+              <p:nvPr/>
+            </p:nvSpPr>
+            <p:spPr>
+              <a:xfrm>
+                <a:off x="1428736" y="1166786"/>
+                <a:ext cx="3714776" cy="500066"/>
+              </a:xfrm>
+              <a:prstGeom prst="rect">
+                <a:avLst/>
+              </a:prstGeom>
+            </p:spPr>
+            <p:style>
+              <a:lnRef idx="2">
+                <a:schemeClr val="dk1"/>
+              </a:lnRef>
+              <a:fillRef idx="1">
+                <a:schemeClr val="lt1"/>
+              </a:fillRef>
+              <a:effectRef idx="0">
+                <a:schemeClr val="dk1"/>
+              </a:effectRef>
+              <a:fontRef idx="minor">
+                <a:schemeClr val="dk1"/>
+              </a:fontRef>
+            </p:style>
+            <p:txBody>
+              <a:bodyPr wrap="none" rtlCol="0" anchor="ctr"/>
+              <a:lstStyle/>
+              <a:p>
+                <a:r>
+                  <a:rPr lang="en-US" dirty="0" err="1" smtClean="0"/>
+                  <a:t>term_result</a:t>
+                </a:r>
+                <a:r>
+                  <a:rPr lang="en-US" dirty="0" smtClean="0"/>
+                  <a:t> = </a:t>
+                </a:r>
+                <a:r>
+                  <a:rPr lang="en-US" dirty="0" err="1" smtClean="0"/>
+                  <a:t>pow_result</a:t>
+                </a:r>
+                <a:r>
+                  <a:rPr lang="en-US" dirty="0" smtClean="0"/>
+                  <a:t>/</a:t>
+                </a:r>
+                <a:r>
+                  <a:rPr lang="en-US" dirty="0" err="1" smtClean="0"/>
+                  <a:t>fact_result</a:t>
+                </a:r>
+                <a:endParaRPr lang="en-US" dirty="0" smtClean="0"/>
+              </a:p>
+            </p:txBody>
+          </p:sp>
+          <p:sp>
+            <p:nvSpPr>
+              <p:cNvPr id="3" name="Rectangle 2"/>
+              <p:cNvSpPr/>
+              <p:nvPr/>
+            </p:nvSpPr>
+            <p:spPr>
+              <a:xfrm>
+                <a:off x="1214422" y="1833506"/>
+                <a:ext cx="4143404" cy="500066"/>
+              </a:xfrm>
+              <a:prstGeom prst="rect">
+                <a:avLst/>
+              </a:prstGeom>
+            </p:spPr>
+            <p:style>
+              <a:lnRef idx="2">
+                <a:schemeClr val="dk1"/>
+              </a:lnRef>
+              <a:fillRef idx="1">
+                <a:schemeClr val="lt1"/>
+              </a:fillRef>
+              <a:effectRef idx="0">
+                <a:schemeClr val="dk1"/>
+              </a:effectRef>
+              <a:fontRef idx="minor">
+                <a:schemeClr val="dk1"/>
+              </a:fontRef>
+            </p:style>
+            <p:txBody>
+              <a:bodyPr wrap="none" rtlCol="0" anchor="ctr"/>
+              <a:lstStyle/>
+              <a:p>
+                <a:r>
+                  <a:rPr lang="en-US" dirty="0" err="1" smtClean="0"/>
+                  <a:t>final_result</a:t>
+                </a:r>
+                <a:r>
+                  <a:rPr lang="en-US" dirty="0" smtClean="0"/>
+                  <a:t> = </a:t>
+                </a:r>
+                <a:r>
+                  <a:rPr lang="en-US" dirty="0" err="1" smtClean="0"/>
+                  <a:t>final_result</a:t>
+                </a:r>
+                <a:r>
+                  <a:rPr lang="en-US" dirty="0" smtClean="0"/>
+                  <a:t> + </a:t>
+                </a:r>
+                <a:r>
+                  <a:rPr lang="en-US" dirty="0" err="1" smtClean="0"/>
+                  <a:t>term_result</a:t>
+                </a:r>
+                <a:endParaRPr lang="en-US" dirty="0" smtClean="0"/>
+              </a:p>
+            </p:txBody>
+          </p:sp>
+          <p:sp>
+            <p:nvSpPr>
+              <p:cNvPr id="4" name="Flowchart: Display 3"/>
+              <p:cNvSpPr/>
+              <p:nvPr/>
+            </p:nvSpPr>
+            <p:spPr>
+              <a:xfrm>
+                <a:off x="2497922" y="3524240"/>
+                <a:ext cx="1643074" cy="500066"/>
+              </a:xfrm>
+              <a:prstGeom prst="flowChartDisplay">
+                <a:avLst/>
+              </a:prstGeom>
+            </p:spPr>
+            <p:style>
+              <a:lnRef idx="2">
+                <a:schemeClr val="dk1"/>
+              </a:lnRef>
+              <a:fillRef idx="1">
+                <a:schemeClr val="lt1"/>
+              </a:fillRef>
+              <a:effectRef idx="0">
+                <a:schemeClr val="dk1"/>
+              </a:effectRef>
+              <a:fontRef idx="minor">
+                <a:schemeClr val="dk1"/>
+              </a:fontRef>
+            </p:style>
+            <p:txBody>
+              <a:bodyPr wrap="none" rtlCol="0" anchor="ctr"/>
+              <a:lstStyle/>
+              <a:p>
+                <a:r>
+                  <a:rPr lang="en-US" dirty="0" err="1" smtClean="0"/>
+                  <a:t>final_result</a:t>
+                </a:r>
+                <a:endParaRPr lang="en-US" dirty="0" smtClean="0"/>
+              </a:p>
+            </p:txBody>
+          </p:sp>
+          <p:sp>
+            <p:nvSpPr>
+              <p:cNvPr id="5" name="Oval 4"/>
+              <p:cNvSpPr/>
+              <p:nvPr/>
+            </p:nvSpPr>
+            <p:spPr>
+              <a:xfrm>
+                <a:off x="2747955" y="4167182"/>
+                <a:ext cx="1143008" cy="571504"/>
+              </a:xfrm>
+              <a:prstGeom prst="ellipse">
+                <a:avLst/>
+              </a:prstGeom>
+            </p:spPr>
+            <p:style>
+              <a:lnRef idx="2">
+                <a:schemeClr val="dk1"/>
+              </a:lnRef>
+              <a:fillRef idx="1">
+                <a:schemeClr val="lt1"/>
+              </a:fillRef>
+              <a:effectRef idx="0">
+                <a:schemeClr val="dk1"/>
+              </a:effectRef>
+              <a:fontRef idx="minor">
+                <a:schemeClr val="dk1"/>
+              </a:fontRef>
+            </p:style>
+            <p:txBody>
+              <a:bodyPr rtlCol="0" anchor="ctr"/>
+              <a:lstStyle/>
+              <a:p>
+                <a:pPr algn="ctr"/>
+                <a:r>
+                  <a:rPr lang="en-IN" dirty="0" smtClean="0"/>
+                  <a:t>stop</a:t>
+                </a:r>
+                <a:endParaRPr lang="en-US" dirty="0"/>
+              </a:p>
+            </p:txBody>
+          </p:sp>
+          <p:cxnSp>
+            <p:nvCxnSpPr>
+              <p:cNvPr id="6" name="Straight Arrow Connector 5"/>
+              <p:cNvCxnSpPr>
+                <a:stCxn id="2" idx="2"/>
+                <a:endCxn id="3" idx="0"/>
+              </p:cNvCxnSpPr>
+              <p:nvPr/>
+            </p:nvCxnSpPr>
+            <p:spPr>
+              <a:xfrm rot="5400000">
+                <a:off x="3202797" y="1750179"/>
+                <a:ext cx="166654" cy="1588"/>
+              </a:xfrm>
+              <a:prstGeom prst="straightConnector1">
+                <a:avLst/>
+              </a:prstGeom>
+              <a:ln>
+                <a:tailEnd type="arrow"/>
+              </a:ln>
+            </p:spPr>
+            <p:style>
+              <a:lnRef idx="1">
+                <a:schemeClr val="dk1"/>
+              </a:lnRef>
+              <a:fillRef idx="0">
+                <a:schemeClr val="dk1"/>
+              </a:fillRef>
+              <a:effectRef idx="0">
+                <a:schemeClr val="dk1"/>
+              </a:effectRef>
+              <a:fontRef idx="minor">
+                <a:schemeClr val="tx1"/>
+              </a:fontRef>
+            </p:style>
+          </p:cxnSp>
+          <p:cxnSp>
+            <p:nvCxnSpPr>
+              <p:cNvPr id="12" name="Straight Arrow Connector 11"/>
+              <p:cNvCxnSpPr>
+                <a:stCxn id="4" idx="2"/>
+                <a:endCxn id="5" idx="0"/>
+              </p:cNvCxnSpPr>
+              <p:nvPr/>
+            </p:nvCxnSpPr>
+            <p:spPr>
+              <a:xfrm rot="5400000">
+                <a:off x="3248021" y="4095744"/>
+                <a:ext cx="142876" cy="1588"/>
+              </a:xfrm>
+              <a:prstGeom prst="straightConnector1">
+                <a:avLst/>
+              </a:prstGeom>
+              <a:ln>
+                <a:tailEnd type="arrow"/>
+              </a:ln>
+            </p:spPr>
+            <p:style>
+              <a:lnRef idx="1">
+                <a:schemeClr val="dk1"/>
+              </a:lnRef>
+              <a:fillRef idx="0">
+                <a:schemeClr val="dk1"/>
+              </a:fillRef>
+              <a:effectRef idx="0">
+                <a:schemeClr val="dk1"/>
+              </a:effectRef>
+              <a:fontRef idx="minor">
+                <a:schemeClr val="tx1"/>
+              </a:fontRef>
+            </p:style>
+          </p:cxnSp>
+          <p:sp>
+            <p:nvSpPr>
+              <p:cNvPr id="18" name="Oval 17"/>
+              <p:cNvSpPr/>
+              <p:nvPr/>
+            </p:nvSpPr>
+            <p:spPr>
+              <a:xfrm>
+                <a:off x="3071810" y="523844"/>
+                <a:ext cx="428628" cy="428628"/>
+              </a:xfrm>
+              <a:prstGeom prst="ellipse">
+                <a:avLst/>
+              </a:prstGeom>
+            </p:spPr>
+            <p:style>
+              <a:lnRef idx="2">
+                <a:schemeClr val="dk1"/>
+              </a:lnRef>
+              <a:fillRef idx="1">
+                <a:schemeClr val="lt1"/>
+              </a:fillRef>
+              <a:effectRef idx="0">
+                <a:schemeClr val="dk1"/>
+              </a:effectRef>
+              <a:fontRef idx="minor">
+                <a:schemeClr val="dk1"/>
+              </a:fontRef>
+            </p:style>
+            <p:txBody>
+              <a:bodyPr rtlCol="0" anchor="ctr"/>
+              <a:lstStyle/>
+              <a:p>
+                <a:pPr algn="ctr"/>
+                <a:r>
+                  <a:rPr lang="en-IN" dirty="0" smtClean="0"/>
+                  <a:t>A</a:t>
+                </a:r>
+                <a:endParaRPr lang="en-US" dirty="0"/>
+              </a:p>
+            </p:txBody>
+          </p:sp>
+          <p:cxnSp>
+            <p:nvCxnSpPr>
+              <p:cNvPr id="19" name="Straight Arrow Connector 18"/>
+              <p:cNvCxnSpPr>
+                <a:stCxn id="18" idx="4"/>
+                <a:endCxn id="2" idx="0"/>
+              </p:cNvCxnSpPr>
+              <p:nvPr/>
+            </p:nvCxnSpPr>
+            <p:spPr>
+              <a:xfrm rot="5400000">
+                <a:off x="3178967" y="1059629"/>
+                <a:ext cx="214314" cy="1588"/>
+              </a:xfrm>
+              <a:prstGeom prst="straightConnector1">
+                <a:avLst/>
+              </a:prstGeom>
+              <a:ln>
+                <a:tailEnd type="arrow"/>
+              </a:ln>
+            </p:spPr>
+            <p:style>
+              <a:lnRef idx="1">
+                <a:schemeClr val="dk1"/>
+              </a:lnRef>
+              <a:fillRef idx="0">
+                <a:schemeClr val="dk1"/>
+              </a:fillRef>
+              <a:effectRef idx="0">
+                <a:schemeClr val="dk1"/>
+              </a:effectRef>
+              <a:fontRef idx="minor">
+                <a:schemeClr val="tx1"/>
+              </a:fontRef>
+            </p:style>
+          </p:cxnSp>
+          <p:sp>
+            <p:nvSpPr>
+              <p:cNvPr id="22" name="Oval 21"/>
+              <p:cNvSpPr/>
+              <p:nvPr/>
+            </p:nvSpPr>
+            <p:spPr>
+              <a:xfrm>
+                <a:off x="4929198" y="3557578"/>
+                <a:ext cx="428628" cy="428628"/>
+              </a:xfrm>
+              <a:prstGeom prst="ellipse">
+                <a:avLst/>
+              </a:prstGeom>
+            </p:spPr>
+            <p:style>
+              <a:lnRef idx="2">
+                <a:schemeClr val="dk1"/>
+              </a:lnRef>
+              <a:fillRef idx="1">
+                <a:schemeClr val="lt1"/>
+              </a:fillRef>
+              <a:effectRef idx="0">
+                <a:schemeClr val="dk1"/>
+              </a:effectRef>
+              <a:fontRef idx="minor">
+                <a:schemeClr val="dk1"/>
+              </a:fontRef>
+            </p:style>
+            <p:txBody>
+              <a:bodyPr rtlCol="0" anchor="ctr"/>
+              <a:lstStyle/>
+              <a:p>
+                <a:pPr algn="ctr"/>
+                <a:r>
+                  <a:rPr lang="en-IN" dirty="0" smtClean="0"/>
+                  <a:t>B</a:t>
+                </a:r>
+                <a:endParaRPr lang="en-US" dirty="0"/>
+              </a:p>
+            </p:txBody>
+          </p:sp>
+          <p:cxnSp>
+            <p:nvCxnSpPr>
+              <p:cNvPr id="23" name="Straight Arrow Connector 22"/>
+              <p:cNvCxnSpPr>
+                <a:stCxn id="22" idx="2"/>
+                <a:endCxn id="4" idx="3"/>
+              </p:cNvCxnSpPr>
+              <p:nvPr/>
+            </p:nvCxnSpPr>
+            <p:spPr>
+              <a:xfrm rot="10800000" flipV="1">
+                <a:off x="4140996" y="3771891"/>
+                <a:ext cx="788202" cy="2381"/>
+              </a:xfrm>
+              <a:prstGeom prst="straightConnector1">
+                <a:avLst/>
+              </a:prstGeom>
+              <a:ln>
+                <a:tailEnd type="arrow"/>
+              </a:ln>
+            </p:spPr>
+            <p:style>
+              <a:lnRef idx="1">
+                <a:schemeClr val="dk1"/>
+              </a:lnRef>
+              <a:fillRef idx="0">
+                <a:schemeClr val="dk1"/>
+              </a:fillRef>
+              <a:effectRef idx="0">
+                <a:schemeClr val="dk1"/>
+              </a:effectRef>
+              <a:fontRef idx="minor">
+                <a:schemeClr val="tx1"/>
+              </a:fontRef>
+            </p:style>
+          </p:cxnSp>
+        </p:grpSp>
+        <p:sp>
+          <p:nvSpPr>
+            <p:cNvPr id="14" name="Rectangle 13"/>
+            <p:cNvSpPr/>
+            <p:nvPr/>
+          </p:nvSpPr>
+          <p:spPr>
+            <a:xfrm>
+              <a:off x="2857496" y="2738422"/>
+              <a:ext cx="857256" cy="500066"/>
+            </a:xfrm>
+            <a:prstGeom prst="rect">
+              <a:avLst/>
+            </a:prstGeom>
+          </p:spPr>
+          <p:style>
+            <a:lnRef idx="2">
+              <a:schemeClr val="dk1"/>
+            </a:lnRef>
+            <a:fillRef idx="1">
+              <a:schemeClr val="lt1"/>
+            </a:fillRef>
+            <a:effectRef idx="0">
+              <a:schemeClr val="dk1"/>
+            </a:effectRef>
+            <a:fontRef idx="minor">
+              <a:schemeClr val="dk1"/>
+            </a:fontRef>
+          </p:style>
+          <p:txBody>
+            <a:bodyPr wrap="none" rtlCol="0" anchor="ctr"/>
+            <a:lstStyle/>
+            <a:p>
+              <a:r>
+                <a:rPr lang="en-IN" dirty="0" err="1" smtClean="0"/>
+                <a:t>i</a:t>
+              </a:r>
+              <a:r>
+                <a:rPr lang="en-IN" dirty="0" smtClean="0"/>
+                <a:t> = </a:t>
+              </a:r>
+              <a:r>
+                <a:rPr lang="en-IN" dirty="0" err="1" smtClean="0"/>
+                <a:t>i</a:t>
+              </a:r>
+              <a:r>
+                <a:rPr lang="en-IN" dirty="0" smtClean="0"/>
+                <a:t> + 1</a:t>
+              </a:r>
+              <a:endParaRPr lang="en-US" dirty="0" smtClean="0"/>
+            </a:p>
+          </p:txBody>
+        </p:sp>
+        <p:sp>
+          <p:nvSpPr>
+            <p:cNvPr id="15" name="Oval 14"/>
+            <p:cNvSpPr/>
+            <p:nvPr/>
+          </p:nvSpPr>
+          <p:spPr>
+            <a:xfrm>
+              <a:off x="1928802" y="2776523"/>
+              <a:ext cx="428628" cy="428628"/>
+            </a:xfrm>
+            <a:prstGeom prst="ellipse">
+              <a:avLst/>
+            </a:prstGeom>
+          </p:spPr>
+          <p:style>
+            <a:lnRef idx="2">
+              <a:schemeClr val="dk1"/>
+            </a:lnRef>
+            <a:fillRef idx="1">
+              <a:schemeClr val="lt1"/>
+            </a:fillRef>
+            <a:effectRef idx="0">
+              <a:schemeClr val="dk1"/>
+            </a:effectRef>
+            <a:fontRef idx="minor">
+              <a:schemeClr val="dk1"/>
+            </a:fontRef>
+          </p:style>
+          <p:txBody>
+            <a:bodyPr rtlCol="0" anchor="ctr"/>
+            <a:lstStyle/>
+            <a:p>
+              <a:pPr algn="ctr"/>
+              <a:r>
+                <a:rPr lang="en-IN" dirty="0" smtClean="0"/>
+                <a:t>C</a:t>
+              </a:r>
+              <a:endParaRPr lang="en-US" dirty="0"/>
+            </a:p>
+          </p:txBody>
+        </p:sp>
+        <p:cxnSp>
+          <p:nvCxnSpPr>
+            <p:cNvPr id="16" name="Straight Arrow Connector 15"/>
+            <p:cNvCxnSpPr>
+              <a:stCxn id="14" idx="1"/>
+              <a:endCxn id="15" idx="6"/>
+            </p:cNvCxnSpPr>
+            <p:nvPr/>
+          </p:nvCxnSpPr>
+          <p:spPr>
+            <a:xfrm rot="10800000" flipV="1">
+              <a:off x="2357430" y="2988455"/>
+              <a:ext cx="500066" cy="2382"/>
+            </a:xfrm>
+            <a:prstGeom prst="straightConnector1">
+              <a:avLst/>
+            </a:prstGeom>
+            <a:ln>
+              <a:tailEnd type="arrow"/>
+            </a:ln>
+          </p:spPr>
+          <p:style>
+            <a:lnRef idx="1">
+              <a:schemeClr val="dk1"/>
+            </a:lnRef>
+            <a:fillRef idx="0">
+              <a:schemeClr val="dk1"/>
+            </a:fillRef>
+            <a:effectRef idx="0">
+              <a:schemeClr val="dk1"/>
+            </a:effectRef>
+            <a:fontRef idx="minor">
+              <a:schemeClr val="tx1"/>
+            </a:fontRef>
+          </p:style>
+        </p:cxnSp>
+        <p:cxnSp>
+          <p:nvCxnSpPr>
+            <p:cNvPr id="21" name="Straight Arrow Connector 20"/>
+            <p:cNvCxnSpPr>
+              <a:stCxn id="3" idx="2"/>
+              <a:endCxn id="14" idx="0"/>
+            </p:cNvCxnSpPr>
+            <p:nvPr/>
+          </p:nvCxnSpPr>
+          <p:spPr>
+            <a:xfrm rot="5400000">
+              <a:off x="3083699" y="2535997"/>
+              <a:ext cx="404850" cy="1588"/>
+            </a:xfrm>
+            <a:prstGeom prst="straightConnector1">
+              <a:avLst/>
+            </a:prstGeom>
+            <a:ln>
+              <a:tailEnd type="arrow"/>
+            </a:ln>
+          </p:spPr>
+          <p:style>
+            <a:lnRef idx="1">
+              <a:schemeClr val="dk1"/>
+            </a:lnRef>
+            <a:fillRef idx="0">
+              <a:schemeClr val="dk1"/>
+            </a:fillRef>
+            <a:effectRef idx="0">
+              <a:schemeClr val="dk1"/>
+            </a:effectRef>
+            <a:fontRef idx="minor">
+              <a:schemeClr val="tx1"/>
+            </a:fontRef>
+          </p:style>
+        </p:cxnSp>
+      </p:grpSp>
+    </p:spTree>
+  </p:cSld>
+  <p:clrMapOvr>
+    <a:masterClrMapping/>
+  </p:clrMapOvr>
+</p:sld>
+</file>
+
+<file path=ppt/slides/slide5.xml><?xml version="1.0" encoding="utf-8"?>
 <p:sld xmlns:a="http://schemas.openxmlformats.org/drawingml/2006/main" xmlns:r="http://schemas.openxmlformats.org/officeDocument/2006/relationships" xmlns:p="http://schemas.openxmlformats.org/presentationml/2006/main">
   <p:cSld>
     <p:spTree>
@@ -5404,4 +7839,287 @@
   <a:objectDefaults/>
   <a:extraClrSchemeLst/>
 </a:theme>
+</file>
+
+<file path=ppt/theme/theme2.xml><?xml version="1.0" encoding="utf-8"?>
+<a:theme xmlns:a="http://schemas.openxmlformats.org/drawingml/2006/main" name="Office Theme">
+  <a:themeElements>
+    <a:clrScheme name="Office">
+      <a:dk1>
+        <a:sysClr val="windowText" lastClr="000000"/>
+      </a:dk1>
+      <a:lt1>
+        <a:sysClr val="window" lastClr="FFFFFF"/>
+      </a:lt1>
+      <a:dk2>
+        <a:srgbClr val="1F497D"/>
+      </a:dk2>
+      <a:lt2>
+        <a:srgbClr val="EEECE1"/>
+      </a:lt2>
+      <a:accent1>
+        <a:srgbClr val="4F81BD"/>
+      </a:accent1>
+      <a:accent2>
+        <a:srgbClr val="C0504D"/>
+      </a:accent2>
+      <a:accent3>
+        <a:srgbClr val="9BBB59"/>
+      </a:accent3>
+      <a:accent4>
+        <a:srgbClr val="8064A2"/>
+      </a:accent4>
+      <a:accent5>
+        <a:srgbClr val="4BACC6"/>
+      </a:accent5>
+      <a:accent6>
+        <a:srgbClr val="F79646"/>
+      </a:accent6>
+      <a:hlink>
+        <a:srgbClr val="0000FF"/>
+      </a:hlink>
+      <a:folHlink>
+        <a:srgbClr val="800080"/>
+      </a:folHlink>
+    </a:clrScheme>
+    <a:fontScheme name="Office">
+      <a:majorFont>
+        <a:latin typeface="Calibri"/>
+        <a:ea typeface=""/>
+        <a:cs typeface=""/>
+        <a:font script="Jpan" typeface="ＭＳ Ｐゴシック"/>
+        <a:font script="Hang" typeface="맑은 고딕"/>
+        <a:font script="Hans" typeface="宋体"/>
+        <a:font script="Hant" typeface="新細明體"/>
+        <a:font script="Arab" typeface="Times New Roman"/>
+        <a:font script="Hebr" typeface="Times New Roman"/>
+        <a:font script="Thai" typeface="Angsana New"/>
+        <a:font script="Ethi" typeface="Nyala"/>
+        <a:font script="Beng" typeface="Vrinda"/>
+        <a:font script="Gujr" typeface="Shruti"/>
+        <a:font script="Khmr" typeface="MoolBoran"/>
+        <a:font script="Knda" typeface="Tunga"/>
+        <a:font script="Guru" typeface="Raavi"/>
+        <a:font script="Cans" typeface="Euphemia"/>
+        <a:font script="Cher" typeface="Plantagenet Cherokee"/>
+        <a:font script="Yiii" typeface="Microsoft Yi Baiti"/>
+        <a:font script="Tibt" typeface="Microsoft Himalaya"/>
+        <a:font script="Thaa" typeface="MV Boli"/>
+        <a:font script="Deva" typeface="Mangal"/>
+        <a:font script="Telu" typeface="Gautami"/>
+        <a:font script="Taml" typeface="Latha"/>
+        <a:font script="Syrc" typeface="Estrangelo Edessa"/>
+        <a:font script="Orya" typeface="Kalinga"/>
+        <a:font script="Mlym" typeface="Kartika"/>
+        <a:font script="Laoo" typeface="DokChampa"/>
+        <a:font script="Sinh" typeface="Iskoola Pota"/>
+        <a:font script="Mong" typeface="Mongolian Baiti"/>
+        <a:font script="Viet" typeface="Times New Roman"/>
+        <a:font script="Uigh" typeface="Microsoft Uighur"/>
+      </a:majorFont>
+      <a:minorFont>
+        <a:latin typeface="Calibri"/>
+        <a:ea typeface=""/>
+        <a:cs typeface=""/>
+        <a:font script="Jpan" typeface="ＭＳ Ｐゴシック"/>
+        <a:font script="Hang" typeface="맑은 고딕"/>
+        <a:font script="Hans" typeface="宋体"/>
+        <a:font script="Hant" typeface="新細明體"/>
+        <a:font script="Arab" typeface="Arial"/>
+        <a:font script="Hebr" typeface="Arial"/>
+        <a:font script="Thai" typeface="Cordia New"/>
+        <a:font script="Ethi" typeface="Nyala"/>
+        <a:font script="Beng" typeface="Vrinda"/>
+        <a:font script="Gujr" typeface="Shruti"/>
+        <a:font script="Khmr" typeface="DaunPenh"/>
+        <a:font script="Knda" typeface="Tunga"/>
+        <a:font script="Guru" typeface="Raavi"/>
+        <a:font script="Cans" typeface="Euphemia"/>
+        <a:font script="Cher" typeface="Plantagenet Cherokee"/>
+        <a:font script="Yiii" typeface="Microsoft Yi Baiti"/>
+        <a:font script="Tibt" typeface="Microsoft Himalaya"/>
+        <a:font script="Thaa" typeface="MV Boli"/>
+        <a:font script="Deva" typeface="Mangal"/>
+        <a:font script="Telu" typeface="Gautami"/>
+        <a:font script="Taml" typeface="Latha"/>
+        <a:font script="Syrc" typeface="Estrangelo Edessa"/>
+        <a:font script="Orya" typeface="Kalinga"/>
+        <a:font script="Mlym" typeface="Kartika"/>
+        <a:font script="Laoo" typeface="DokChampa"/>
+        <a:font script="Sinh" typeface="Iskoola Pota"/>
+        <a:font script="Mong" typeface="Mongolian Baiti"/>
+        <a:font script="Viet" typeface="Arial"/>
+        <a:font script="Uigh" typeface="Microsoft Uighur"/>
+      </a:minorFont>
+    </a:fontScheme>
+    <a:fmtScheme name="Office">
+      <a:fillStyleLst>
+        <a:solidFill>
+          <a:schemeClr val="phClr"/>
+        </a:solidFill>
+        <a:gradFill rotWithShape="1">
+          <a:gsLst>
+            <a:gs pos="0">
+              <a:schemeClr val="phClr">
+                <a:tint val="50000"/>
+                <a:satMod val="300000"/>
+              </a:schemeClr>
+            </a:gs>
+            <a:gs pos="35000">
+              <a:schemeClr val="phClr">
+                <a:tint val="37000"/>
+                <a:satMod val="300000"/>
+              </a:schemeClr>
+            </a:gs>
+            <a:gs pos="100000">
+              <a:schemeClr val="phClr">
+                <a:tint val="15000"/>
+                <a:satMod val="350000"/>
+              </a:schemeClr>
+            </a:gs>
+          </a:gsLst>
+          <a:lin ang="16200000" scaled="1"/>
+        </a:gradFill>
+        <a:gradFill rotWithShape="1">
+          <a:gsLst>
+            <a:gs pos="0">
+              <a:schemeClr val="phClr">
+                <a:shade val="51000"/>
+                <a:satMod val="130000"/>
+              </a:schemeClr>
+            </a:gs>
+            <a:gs pos="80000">
+              <a:schemeClr val="phClr">
+                <a:shade val="93000"/>
+                <a:satMod val="130000"/>
+              </a:schemeClr>
+            </a:gs>
+            <a:gs pos="100000">
+              <a:schemeClr val="phClr">
+                <a:shade val="94000"/>
+                <a:satMod val="135000"/>
+              </a:schemeClr>
+            </a:gs>
+          </a:gsLst>
+          <a:lin ang="16200000" scaled="0"/>
+        </a:gradFill>
+      </a:fillStyleLst>
+      <a:lnStyleLst>
+        <a:ln w="9525" cap="flat" cmpd="sng" algn="ctr">
+          <a:solidFill>
+            <a:schemeClr val="phClr">
+              <a:shade val="95000"/>
+              <a:satMod val="105000"/>
+            </a:schemeClr>
+          </a:solidFill>
+          <a:prstDash val="solid"/>
+        </a:ln>
+        <a:ln w="25400" cap="flat" cmpd="sng" algn="ctr">
+          <a:solidFill>
+            <a:schemeClr val="phClr"/>
+          </a:solidFill>
+          <a:prstDash val="solid"/>
+        </a:ln>
+        <a:ln w="38100" cap="flat" cmpd="sng" algn="ctr">
+          <a:solidFill>
+            <a:schemeClr val="phClr"/>
+          </a:solidFill>
+          <a:prstDash val="solid"/>
+        </a:ln>
+      </a:lnStyleLst>
+      <a:effectStyleLst>
+        <a:effectStyle>
+          <a:effectLst>
+            <a:outerShdw blurRad="40000" dist="20000" dir="5400000" rotWithShape="0">
+              <a:srgbClr val="000000">
+                <a:alpha val="38000"/>
+              </a:srgbClr>
+            </a:outerShdw>
+          </a:effectLst>
+        </a:effectStyle>
+        <a:effectStyle>
+          <a:effectLst>
+            <a:outerShdw blurRad="40000" dist="23000" dir="5400000" rotWithShape="0">
+              <a:srgbClr val="000000">
+                <a:alpha val="35000"/>
+              </a:srgbClr>
+            </a:outerShdw>
+          </a:effectLst>
+        </a:effectStyle>
+        <a:effectStyle>
+          <a:effectLst>
+            <a:outerShdw blurRad="40000" dist="23000" dir="5400000" rotWithShape="0">
+              <a:srgbClr val="000000">
+                <a:alpha val="35000"/>
+              </a:srgbClr>
+            </a:outerShdw>
+          </a:effectLst>
+          <a:scene3d>
+            <a:camera prst="orthographicFront">
+              <a:rot lat="0" lon="0" rev="0"/>
+            </a:camera>
+            <a:lightRig rig="threePt" dir="t">
+              <a:rot lat="0" lon="0" rev="1200000"/>
+            </a:lightRig>
+          </a:scene3d>
+          <a:sp3d>
+            <a:bevelT w="63500" h="25400"/>
+          </a:sp3d>
+        </a:effectStyle>
+      </a:effectStyleLst>
+      <a:bgFillStyleLst>
+        <a:solidFill>
+          <a:schemeClr val="phClr"/>
+        </a:solidFill>
+        <a:gradFill rotWithShape="1">
+          <a:gsLst>
+            <a:gs pos="0">
+              <a:schemeClr val="phClr">
+                <a:tint val="40000"/>
+                <a:satMod val="350000"/>
+              </a:schemeClr>
+            </a:gs>
+            <a:gs pos="40000">
+              <a:schemeClr val="phClr">
+                <a:tint val="45000"/>
+                <a:shade val="99000"/>
+                <a:satMod val="350000"/>
+              </a:schemeClr>
+            </a:gs>
+            <a:gs pos="100000">
+              <a:schemeClr val="phClr">
+                <a:shade val="20000"/>
+                <a:satMod val="255000"/>
+              </a:schemeClr>
+            </a:gs>
+          </a:gsLst>
+          <a:path path="circle">
+            <a:fillToRect l="50000" t="-80000" r="50000" b="180000"/>
+          </a:path>
+        </a:gradFill>
+        <a:gradFill rotWithShape="1">
+          <a:gsLst>
+            <a:gs pos="0">
+              <a:schemeClr val="phClr">
+                <a:tint val="80000"/>
+                <a:satMod val="300000"/>
+              </a:schemeClr>
+            </a:gs>
+            <a:gs pos="100000">
+              <a:schemeClr val="phClr">
+                <a:shade val="30000"/>
+                <a:satMod val="200000"/>
+              </a:schemeClr>
+            </a:gs>
+          </a:gsLst>
+          <a:path path="circle">
+            <a:fillToRect l="50000" t="50000" r="50000" b="50000"/>
+          </a:path>
+        </a:gradFill>
+      </a:bgFillStyleLst>
+    </a:fmtScheme>
+  </a:themeElements>
+  <a:objectDefaults/>
+  <a:extraClrSchemeLst/>
+</a:theme>
 </file>
</xml_diff>